<commit_message>
modif diapo et word
</commit_message>
<xml_diff>
--- a/Présentation TER v2.pptx
+++ b/Présentation TER v2.pptx
@@ -226,7 +226,7 @@
           <a:p>
             <a:fld id="{9D419245-A07A-440F-95A0-D12F2199305C}" type="datetimeFigureOut">
               <a:rPr lang="fr-FR" smtClean="0"/>
-              <a:t>15/06/2025</a:t>
+              <a:t>18/06/2025</a:t>
             </a:fld>
             <a:endParaRPr lang="fr-FR"/>
           </a:p>
@@ -537,6 +537,39 @@
           <a:bodyPr/>
           <a:lstStyle/>
           <a:p>
+            <a:r>
+              <a:rPr lang="fr-FR" dirty="0"/>
+              <a:t>Bonjour à toutes et à tous,</a:t>
+            </a:r>
+          </a:p>
+          <a:p>
+            <a:r>
+              <a:rPr lang="fr-FR" dirty="0"/>
+              <a:t>Tout d’abord, je tiens à remercier les membres du jury d’avoir pris le temps d’évaluer notre travail.</a:t>
+            </a:r>
+            <a:br>
+              <a:rPr lang="fr-FR" dirty="0"/>
+            </a:br>
+            <a:r>
+              <a:rPr lang="fr-FR" dirty="0"/>
+              <a:t>Je souhaite également remercier Madame Émilie </a:t>
+            </a:r>
+            <a:r>
+              <a:rPr lang="fr-FR" dirty="0" err="1"/>
+              <a:t>Pery</a:t>
+            </a:r>
+            <a:r>
+              <a:rPr lang="fr-FR" dirty="0"/>
+              <a:t>, notre encadrante, pour son accompagnement tout au long de ce projet.</a:t>
+            </a:r>
+          </a:p>
+          <a:p>
+            <a:r>
+              <a:rPr lang="fr-FR" dirty="0"/>
+              <a:t>Aujourd’hui, nous allons vous présenter notre Travail d’Étude et de Recherche, qui a consisté à développer une bibliothèque en C++ dédiée au traitement d’images.</a:t>
+            </a:r>
+          </a:p>
+          <a:p>
             <a:endParaRPr lang="fr-FR" dirty="0"/>
           </a:p>
         </p:txBody>
@@ -621,55 +654,433 @@
           <a:bodyPr/>
           <a:lstStyle/>
           <a:p>
-            <a:pPr marL="0" marR="0" lvl="0" indent="0" algn="l" defTabSz="914400" rtl="0" eaLnBrk="1" fontAlgn="auto" latinLnBrk="0" hangingPunct="1">
+            <a:pPr marL="0" indent="0">
+              <a:buFont typeface="Arial" panose="020B0604020202020204" pitchFamily="34" charset="0"/>
+              <a:buNone/>
+            </a:pPr>
+            <a:r>
+              <a:rPr lang="fr-FR" sz="2800" dirty="0"/>
+              <a:t>La version 1.1 de notre bibliothèque marque une évolution importante en intégrant une approche orientée objet. Tout en conservant les fonctionnalités de la première version, on utilisant des class générique (</a:t>
+            </a:r>
+            <a:r>
+              <a:rPr lang="fr-FR" sz="2800" dirty="0" err="1"/>
+              <a:t>template</a:t>
+            </a:r>
+            <a:r>
+              <a:rPr lang="fr-FR" sz="2800" dirty="0"/>
+              <a:t> ) et std::</a:t>
+            </a:r>
+            <a:r>
+              <a:rPr lang="fr-FR" sz="2800" dirty="0" err="1"/>
+              <a:t>vector</a:t>
+            </a:r>
+            <a:r>
+              <a:rPr lang="fr-FR" sz="2800" dirty="0"/>
+              <a:t> pour </a:t>
+            </a:r>
+            <a:r>
+              <a:rPr lang="fr-FR" sz="4000" dirty="0" err="1"/>
+              <a:t>pour</a:t>
+            </a:r>
+            <a:r>
+              <a:rPr lang="fr-FR" sz="4000" dirty="0"/>
+              <a:t> la représentation des images</a:t>
+            </a:r>
+            <a:endParaRPr lang="fr-FR" sz="1800" b="1" i="1" dirty="0">
+              <a:solidFill>
+                <a:srgbClr val="0D0D0D"/>
+              </a:solidFill>
+              <a:effectLst/>
+              <a:latin typeface="Times New Roman" panose="02020603050405020304" pitchFamily="18" charset="0"/>
+              <a:ea typeface="Calibri" panose="020F0502020204030204" pitchFamily="34" charset="0"/>
+            </a:endParaRPr>
+          </a:p>
+          <a:p>
+            <a:pPr marL="0" indent="0">
+              <a:buFont typeface="Arial" panose="020B0604020202020204" pitchFamily="34" charset="0"/>
+              <a:buNone/>
+            </a:pPr>
+            <a:r>
+              <a:rPr lang="fr-FR" sz="1800" b="1" i="1" dirty="0">
+                <a:solidFill>
+                  <a:srgbClr val="0D0D0D"/>
+                </a:solidFill>
+                <a:effectLst/>
+                <a:latin typeface="Times New Roman" panose="02020603050405020304" pitchFamily="18" charset="0"/>
+                <a:ea typeface="Calibri" panose="020F0502020204030204" pitchFamily="34" charset="0"/>
+              </a:rPr>
+              <a:t>La class Image</a:t>
+            </a:r>
+            <a:r>
+              <a:rPr lang="fr-FR" sz="1800" dirty="0">
+                <a:solidFill>
+                  <a:srgbClr val="0D0D0D"/>
+                </a:solidFill>
+                <a:effectLst/>
+                <a:latin typeface="Times New Roman" panose="02020603050405020304" pitchFamily="18" charset="0"/>
+                <a:ea typeface="Calibri" panose="020F0502020204030204" pitchFamily="34" charset="0"/>
+              </a:rPr>
+              <a:t>, qui gère les opérations de base (allocation d’image, création des images, lecture/écriture des fichier brut, conversion de type à un autre)</a:t>
+            </a:r>
+          </a:p>
+          <a:p>
+            <a:pPr algn="just">
               <a:lnSpc>
-                <a:spcPct val="100000"/>
+                <a:spcPct val="150000"/>
               </a:lnSpc>
               <a:spcBef>
-                <a:spcPts val="0"/>
+                <a:spcPts val="600"/>
               </a:spcBef>
-              <a:spcAft>
-                <a:spcPts val="0"/>
-              </a:spcAft>
-              <a:buClrTx/>
-              <a:buSzTx/>
-              <a:buFontTx/>
-              <a:buNone/>
-              <a:tabLst/>
-              <a:defRPr/>
             </a:pPr>
             <a:r>
-              <a:rPr lang="fr-FR" dirty="0">
+              <a:rPr lang="fr-FR" sz="1800" dirty="0">
                 <a:solidFill>
-                  <a:schemeClr val="tx1"/>
+                  <a:srgbClr val="0D0D0D"/>
                 </a:solidFill>
+                <a:effectLst/>
                 <a:latin typeface="Times New Roman" panose="02020603050405020304" pitchFamily="18" charset="0"/>
+                <a:ea typeface="Calibri" panose="020F0502020204030204" pitchFamily="34" charset="0"/>
                 <a:cs typeface="Times New Roman" panose="02020603050405020304" pitchFamily="18" charset="0"/>
               </a:rPr>
-              <a:t>Tout ces traitements sont représentés sous forme d’une class </a:t>
-            </a:r>
-            <a:r>
-              <a:rPr lang="fr-FR" dirty="0" err="1">
+              <a:t>La class </a:t>
+            </a:r>
+            <a:r>
+              <a:rPr lang="fr-FR" sz="1800" b="1" i="1" dirty="0" err="1">
                 <a:solidFill>
-                  <a:schemeClr val="tx1"/>
+                  <a:srgbClr val="0D0D0D"/>
                 </a:solidFill>
+                <a:effectLst/>
                 <a:latin typeface="Times New Roman" panose="02020603050405020304" pitchFamily="18" charset="0"/>
+                <a:ea typeface="Calibri" panose="020F0502020204030204" pitchFamily="34" charset="0"/>
                 <a:cs typeface="Times New Roman" panose="02020603050405020304" pitchFamily="18" charset="0"/>
               </a:rPr>
-              <a:t>template</a:t>
-            </a:r>
-            <a:r>
-              <a:rPr lang="fr-FR" dirty="0">
+              <a:t>ImageRGB</a:t>
+            </a:r>
+            <a:r>
+              <a:rPr lang="fr-FR" sz="1800" dirty="0">
                 <a:solidFill>
-                  <a:schemeClr val="tx1"/>
+                  <a:srgbClr val="0D0D0D"/>
                 </a:solidFill>
+                <a:effectLst/>
                 <a:latin typeface="Times New Roman" panose="02020603050405020304" pitchFamily="18" charset="0"/>
+                <a:ea typeface="Calibri" panose="020F0502020204030204" pitchFamily="34" charset="0"/>
                 <a:cs typeface="Times New Roman" panose="02020603050405020304" pitchFamily="18" charset="0"/>
               </a:rPr>
-              <a:t>. Ces classes héritent soit de la classe abstraite (class de base) Processing1, pour les traitements qui nécessitent une seule image en entrée, soit de la classe Processing2, pour les traitements qui nécessitent deux images en entrée</a:t>
+              <a:t> est une class dérivé de la class </a:t>
+            </a:r>
+            <a:r>
+              <a:rPr lang="fr-FR" sz="1800" b="1" i="1" dirty="0">
+                <a:solidFill>
+                  <a:srgbClr val="0D0D0D"/>
+                </a:solidFill>
+                <a:effectLst/>
+                <a:latin typeface="Times New Roman" panose="02020603050405020304" pitchFamily="18" charset="0"/>
+                <a:ea typeface="Calibri" panose="020F0502020204030204" pitchFamily="34" charset="0"/>
+                <a:cs typeface="Times New Roman" panose="02020603050405020304" pitchFamily="18" charset="0"/>
+              </a:rPr>
+              <a:t>Image </a:t>
+            </a:r>
+            <a:r>
+              <a:rPr lang="fr-FR" sz="1800" dirty="0">
+                <a:solidFill>
+                  <a:srgbClr val="0D0D0D"/>
+                </a:solidFill>
+                <a:effectLst/>
+                <a:latin typeface="Times New Roman" panose="02020603050405020304" pitchFamily="18" charset="0"/>
+                <a:ea typeface="Calibri" panose="020F0502020204030204" pitchFamily="34" charset="0"/>
+                <a:cs typeface="Times New Roman" panose="02020603050405020304" pitchFamily="18" charset="0"/>
+              </a:rPr>
+              <a:t>conçue pour gérer les images en couleurs </a:t>
+            </a:r>
+            <a:r>
+              <a:rPr lang="fr-FR" sz="1800" b="1" i="1" dirty="0">
+                <a:solidFill>
+                  <a:srgbClr val="0D0D0D"/>
+                </a:solidFill>
+                <a:effectLst/>
+                <a:latin typeface="Times New Roman" panose="02020603050405020304" pitchFamily="18" charset="0"/>
+                <a:ea typeface="Calibri" panose="020F0502020204030204" pitchFamily="34" charset="0"/>
+                <a:cs typeface="Times New Roman" panose="02020603050405020304" pitchFamily="18" charset="0"/>
+              </a:rPr>
+              <a:t>RGB</a:t>
+            </a:r>
+            <a:r>
+              <a:rPr lang="fr-FR" sz="1800" dirty="0">
+                <a:solidFill>
+                  <a:srgbClr val="0D0D0D"/>
+                </a:solidFill>
+                <a:effectLst/>
+                <a:latin typeface="Times New Roman" panose="02020603050405020304" pitchFamily="18" charset="0"/>
+                <a:ea typeface="Calibri" panose="020F0502020204030204" pitchFamily="34" charset="0"/>
+                <a:cs typeface="Times New Roman" panose="02020603050405020304" pitchFamily="18" charset="0"/>
+              </a:rPr>
+              <a:t>, elle prend une propriété </a:t>
+            </a:r>
+            <a:r>
+              <a:rPr lang="fr-FR" sz="1800" b="1" i="1" dirty="0">
+                <a:solidFill>
+                  <a:srgbClr val="0D0D0D"/>
+                </a:solidFill>
+                <a:effectLst/>
+                <a:latin typeface="Times New Roman" panose="02020603050405020304" pitchFamily="18" charset="0"/>
+                <a:ea typeface="Calibri" panose="020F0502020204030204" pitchFamily="34" charset="0"/>
+                <a:cs typeface="Times New Roman" panose="02020603050405020304" pitchFamily="18" charset="0"/>
+              </a:rPr>
+              <a:t>_</a:t>
+            </a:r>
+            <a:r>
+              <a:rPr lang="fr-FR" sz="1800" b="1" i="1" dirty="0" err="1">
+                <a:solidFill>
+                  <a:srgbClr val="0D0D0D"/>
+                </a:solidFill>
+                <a:effectLst/>
+                <a:latin typeface="Times New Roman" panose="02020603050405020304" pitchFamily="18" charset="0"/>
+                <a:ea typeface="Calibri" panose="020F0502020204030204" pitchFamily="34" charset="0"/>
+                <a:cs typeface="Times New Roman" panose="02020603050405020304" pitchFamily="18" charset="0"/>
+              </a:rPr>
+              <a:t>ImageRGB</a:t>
+            </a:r>
+            <a:r>
+              <a:rPr lang="fr-FR" sz="1800" dirty="0">
+                <a:solidFill>
+                  <a:srgbClr val="0D0D0D"/>
+                </a:solidFill>
+                <a:effectLst/>
+                <a:latin typeface="Times New Roman" panose="02020603050405020304" pitchFamily="18" charset="0"/>
+                <a:ea typeface="Calibri" panose="020F0502020204030204" pitchFamily="34" charset="0"/>
+                <a:cs typeface="Times New Roman" panose="02020603050405020304" pitchFamily="18" charset="0"/>
+              </a:rPr>
+              <a:t> pour accéder aux données de pixels d’une image</a:t>
+            </a:r>
+            <a:r>
+              <a:rPr lang="fr-FR" sz="1800" b="1" i="1" dirty="0">
+                <a:solidFill>
+                  <a:srgbClr val="0D0D0D"/>
+                </a:solidFill>
+                <a:effectLst/>
+                <a:latin typeface="Times New Roman" panose="02020603050405020304" pitchFamily="18" charset="0"/>
+                <a:ea typeface="Calibri" panose="020F0502020204030204" pitchFamily="34" charset="0"/>
+                <a:cs typeface="Times New Roman" panose="02020603050405020304" pitchFamily="18" charset="0"/>
+              </a:rPr>
+              <a:t> RGB</a:t>
+            </a:r>
+            <a:r>
+              <a:rPr lang="fr-FR" sz="1800" dirty="0">
+                <a:solidFill>
+                  <a:srgbClr val="0D0D0D"/>
+                </a:solidFill>
+                <a:effectLst/>
+                <a:latin typeface="Times New Roman" panose="02020603050405020304" pitchFamily="18" charset="0"/>
+                <a:ea typeface="Calibri" panose="020F0502020204030204" pitchFamily="34" charset="0"/>
+                <a:cs typeface="Times New Roman" panose="02020603050405020304" pitchFamily="18" charset="0"/>
+              </a:rPr>
+              <a:t>. Elle inclut également des méthodes pour lire/écrire des fichiers PPM, charger une LUT binaire, convertir une image RGB en niveaux de gris.</a:t>
             </a:r>
           </a:p>
           <a:p>
+            <a:pPr algn="just">
+              <a:lnSpc>
+                <a:spcPct val="150000"/>
+              </a:lnSpc>
+            </a:pPr>
+            <a:r>
+              <a:rPr lang="fr-FR" sz="1800" dirty="0">
+                <a:solidFill>
+                  <a:srgbClr val="0D0D0D"/>
+                </a:solidFill>
+                <a:effectLst/>
+                <a:latin typeface="Times New Roman" panose="02020603050405020304" pitchFamily="18" charset="0"/>
+                <a:ea typeface="Calibri" panose="020F0502020204030204" pitchFamily="34" charset="0"/>
+                <a:cs typeface="Times New Roman" panose="02020603050405020304" pitchFamily="18" charset="0"/>
+              </a:rPr>
+              <a:t>Cette classe propose aussi une </a:t>
+            </a:r>
+            <a:r>
+              <a:rPr lang="fr-FR" sz="1800" b="1" dirty="0">
+                <a:solidFill>
+                  <a:srgbClr val="0D0D0D"/>
+                </a:solidFill>
+                <a:effectLst/>
+                <a:latin typeface="Times New Roman" panose="02020603050405020304" pitchFamily="18" charset="0"/>
+                <a:ea typeface="Calibri" panose="020F0502020204030204" pitchFamily="34" charset="0"/>
+                <a:cs typeface="Times New Roman" panose="02020603050405020304" pitchFamily="18" charset="0"/>
+              </a:rPr>
+              <a:t>surcharge de constructeurs</a:t>
+            </a:r>
+            <a:r>
+              <a:rPr lang="fr-FR" sz="1800" dirty="0">
+                <a:solidFill>
+                  <a:srgbClr val="0D0D0D"/>
+                </a:solidFill>
+                <a:effectLst/>
+                <a:latin typeface="Times New Roman" panose="02020603050405020304" pitchFamily="18" charset="0"/>
+                <a:ea typeface="Calibri" panose="020F0502020204030204" pitchFamily="34" charset="0"/>
+                <a:cs typeface="Times New Roman" panose="02020603050405020304" pitchFamily="18" charset="0"/>
+              </a:rPr>
+              <a:t> :</a:t>
+            </a:r>
+          </a:p>
+          <a:p>
+            <a:pPr algn="just"/>
+            <a:r>
+              <a:rPr lang="fr-FR" sz="1800" b="1" dirty="0">
+                <a:solidFill>
+                  <a:srgbClr val="0D0D0D"/>
+                </a:solidFill>
+                <a:effectLst/>
+                <a:latin typeface="Times New Roman" panose="02020603050405020304" pitchFamily="18" charset="0"/>
+                <a:ea typeface="Calibri" panose="020F0502020204030204" pitchFamily="34" charset="0"/>
+                <a:cs typeface="Times New Roman" panose="02020603050405020304" pitchFamily="18" charset="0"/>
+              </a:rPr>
+              <a:t>Une class </a:t>
+            </a:r>
+            <a:r>
+              <a:rPr lang="fr-FR" sz="1800" dirty="0">
+                <a:solidFill>
+                  <a:srgbClr val="0D0D0D"/>
+                </a:solidFill>
+                <a:effectLst/>
+                <a:latin typeface="Times New Roman" panose="02020603050405020304" pitchFamily="18" charset="0"/>
+                <a:ea typeface="Calibri" panose="020F0502020204030204" pitchFamily="34" charset="0"/>
+                <a:cs typeface="Times New Roman" panose="02020603050405020304" pitchFamily="18" charset="0"/>
+              </a:rPr>
+              <a:t>est un </a:t>
+            </a:r>
+            <a:r>
+              <a:rPr lang="fr-FR" sz="1800" b="1" dirty="0">
+                <a:solidFill>
+                  <a:srgbClr val="0D0D0D"/>
+                </a:solidFill>
+                <a:effectLst/>
+                <a:latin typeface="Times New Roman" panose="02020603050405020304" pitchFamily="18" charset="0"/>
+                <a:ea typeface="Calibri" panose="020F0502020204030204" pitchFamily="34" charset="0"/>
+                <a:cs typeface="Times New Roman" panose="02020603050405020304" pitchFamily="18" charset="0"/>
+              </a:rPr>
+              <a:t>modèle </a:t>
+            </a:r>
+            <a:r>
+              <a:rPr lang="fr-FR" sz="1800" dirty="0">
+                <a:solidFill>
+                  <a:srgbClr val="0D0D0D"/>
+                </a:solidFill>
+                <a:effectLst/>
+                <a:latin typeface="Times New Roman" panose="02020603050405020304" pitchFamily="18" charset="0"/>
+                <a:ea typeface="Calibri" panose="020F0502020204030204" pitchFamily="34" charset="0"/>
+                <a:cs typeface="Times New Roman" panose="02020603050405020304" pitchFamily="18" charset="0"/>
+              </a:rPr>
+              <a:t>qui sert à </a:t>
+            </a:r>
+            <a:r>
+              <a:rPr lang="fr-FR" sz="1800" b="1" dirty="0">
+                <a:solidFill>
+                  <a:srgbClr val="0D0D0D"/>
+                </a:solidFill>
+                <a:effectLst/>
+                <a:latin typeface="Times New Roman" panose="02020603050405020304" pitchFamily="18" charset="0"/>
+                <a:ea typeface="Calibri" panose="020F0502020204030204" pitchFamily="34" charset="0"/>
+                <a:cs typeface="Times New Roman" panose="02020603050405020304" pitchFamily="18" charset="0"/>
+              </a:rPr>
+              <a:t>créer des objets, elle regroupe des attributs et des fonctions dans une structure cohérente</a:t>
+            </a:r>
+            <a:endParaRPr lang="fr-FR" sz="1800" dirty="0">
+              <a:solidFill>
+                <a:srgbClr val="0D0D0D"/>
+              </a:solidFill>
+              <a:effectLst/>
+              <a:latin typeface="Times New Roman" panose="02020603050405020304" pitchFamily="18" charset="0"/>
+              <a:ea typeface="Calibri" panose="020F0502020204030204" pitchFamily="34" charset="0"/>
+              <a:cs typeface="Times New Roman" panose="02020603050405020304" pitchFamily="18" charset="0"/>
+            </a:endParaRPr>
+          </a:p>
+          <a:p>
+            <a:pPr algn="just"/>
+            <a:r>
+              <a:rPr lang="fr-FR" sz="1800" dirty="0">
+                <a:solidFill>
+                  <a:srgbClr val="0D0D0D"/>
+                </a:solidFill>
+                <a:effectLst/>
+                <a:latin typeface="Times New Roman" panose="02020603050405020304" pitchFamily="18" charset="0"/>
+                <a:ea typeface="Calibri" panose="020F0502020204030204" pitchFamily="34" charset="0"/>
+                <a:cs typeface="Times New Roman" panose="02020603050405020304" pitchFamily="18" charset="0"/>
+              </a:rPr>
+              <a:t>Un </a:t>
+            </a:r>
+            <a:r>
+              <a:rPr lang="fr-FR" sz="1800" b="1" dirty="0">
+                <a:solidFill>
+                  <a:srgbClr val="0D0D0D"/>
+                </a:solidFill>
+                <a:effectLst/>
+                <a:latin typeface="Times New Roman" panose="02020603050405020304" pitchFamily="18" charset="0"/>
+                <a:ea typeface="Calibri" panose="020F0502020204030204" pitchFamily="34" charset="0"/>
+                <a:cs typeface="Times New Roman" panose="02020603050405020304" pitchFamily="18" charset="0"/>
+              </a:rPr>
+              <a:t>constructeur</a:t>
+            </a:r>
+            <a:r>
+              <a:rPr lang="fr-FR" sz="1800" dirty="0">
+                <a:solidFill>
+                  <a:srgbClr val="0D0D0D"/>
+                </a:solidFill>
+                <a:effectLst/>
+                <a:latin typeface="Times New Roman" panose="02020603050405020304" pitchFamily="18" charset="0"/>
+                <a:ea typeface="Calibri" panose="020F0502020204030204" pitchFamily="34" charset="0"/>
+                <a:cs typeface="Times New Roman" panose="02020603050405020304" pitchFamily="18" charset="0"/>
+              </a:rPr>
+              <a:t> est une</a:t>
+            </a:r>
+            <a:r>
+              <a:rPr lang="fr-FR" sz="1800" b="1" dirty="0">
+                <a:solidFill>
+                  <a:srgbClr val="0D0D0D"/>
+                </a:solidFill>
+                <a:effectLst/>
+                <a:latin typeface="Times New Roman" panose="02020603050405020304" pitchFamily="18" charset="0"/>
+                <a:ea typeface="Calibri" panose="020F0502020204030204" pitchFamily="34" charset="0"/>
+                <a:cs typeface="Times New Roman" panose="02020603050405020304" pitchFamily="18" charset="0"/>
+              </a:rPr>
+              <a:t> méthode prends le même nom de la class</a:t>
+            </a:r>
+            <a:r>
+              <a:rPr lang="fr-FR" sz="1800" dirty="0">
+                <a:solidFill>
+                  <a:srgbClr val="0D0D0D"/>
+                </a:solidFill>
+                <a:effectLst/>
+                <a:latin typeface="Times New Roman" panose="02020603050405020304" pitchFamily="18" charset="0"/>
+                <a:ea typeface="Calibri" panose="020F0502020204030204" pitchFamily="34" charset="0"/>
+                <a:cs typeface="Times New Roman" panose="02020603050405020304" pitchFamily="18" charset="0"/>
+              </a:rPr>
+              <a:t> qui est appelée </a:t>
+            </a:r>
+            <a:r>
+              <a:rPr lang="fr-FR" sz="1800" b="1" dirty="0">
+                <a:solidFill>
+                  <a:srgbClr val="0D0D0D"/>
+                </a:solidFill>
+                <a:effectLst/>
+                <a:latin typeface="Times New Roman" panose="02020603050405020304" pitchFamily="18" charset="0"/>
+                <a:ea typeface="Calibri" panose="020F0502020204030204" pitchFamily="34" charset="0"/>
+                <a:cs typeface="Times New Roman" panose="02020603050405020304" pitchFamily="18" charset="0"/>
+              </a:rPr>
+              <a:t>automatiquement lorsqu’un objet est créé.</a:t>
+            </a:r>
+            <a:endParaRPr lang="fr-FR" sz="1800" dirty="0">
+              <a:solidFill>
+                <a:srgbClr val="0D0D0D"/>
+              </a:solidFill>
+              <a:effectLst/>
+              <a:latin typeface="Times New Roman" panose="02020603050405020304" pitchFamily="18" charset="0"/>
+              <a:ea typeface="Calibri" panose="020F0502020204030204" pitchFamily="34" charset="0"/>
+              <a:cs typeface="Times New Roman" panose="02020603050405020304" pitchFamily="18" charset="0"/>
+            </a:endParaRPr>
+          </a:p>
+          <a:p>
+            <a:pPr marL="171450" indent="-171450">
+              <a:buFont typeface="Arial" panose="020B0604020202020204" pitchFamily="34" charset="0"/>
+              <a:buChar char="•"/>
+            </a:pPr>
             <a:endParaRPr lang="fr-FR" dirty="0"/>
           </a:p>
         </p:txBody>
@@ -691,7 +1102,7 @@
           <a:p>
             <a:fld id="{C7B300EB-8BAD-4183-8623-19644C4FEA4C}" type="slidenum">
               <a:rPr lang="fr-FR" smtClean="0"/>
-              <a:t>11</a:t>
+              <a:t>10</a:t>
             </a:fld>
             <a:endParaRPr lang="fr-FR"/>
           </a:p>
@@ -700,7 +1111,7 @@
     </p:spTree>
     <p:extLst>
       <p:ext uri="{BB962C8B-B14F-4D97-AF65-F5344CB8AC3E}">
-        <p14:creationId xmlns:p14="http://schemas.microsoft.com/office/powerpoint/2010/main" val="1373176085"/>
+        <p14:creationId xmlns:p14="http://schemas.microsoft.com/office/powerpoint/2010/main" val="531766603"/>
       </p:ext>
     </p:extLst>
   </p:cSld>
@@ -754,87 +1165,92 @@
           <a:bodyPr/>
           <a:lstStyle/>
           <a:p>
-            <a:pPr marL="457200" lvl="1" indent="0" algn="just">
-              <a:lnSpc>
-                <a:spcPct val="150000"/>
-              </a:lnSpc>
-              <a:spcBef>
-                <a:spcPts val="600"/>
-              </a:spcBef>
-              <a:buFont typeface="Courier New" panose="02070309020205020404" pitchFamily="49" charset="0"/>
-              <a:buNone/>
-            </a:pPr>
-            <a:r>
-              <a:rPr lang="fr-FR" sz="1800" dirty="0">
-                <a:solidFill>
-                  <a:srgbClr val="0D0D0D"/>
-                </a:solidFill>
-                <a:effectLst/>
-                <a:latin typeface="Times New Roman" panose="02020603050405020304" pitchFamily="18" charset="0"/>
-                <a:ea typeface="Calibri" panose="020F0502020204030204" pitchFamily="34" charset="0"/>
-              </a:rPr>
-              <a:t>L’addition de deux images se fait comme suit :</a:t>
+            <a:r>
+              <a:rPr lang="fr-FR" dirty="0"/>
+              <a:t>La </a:t>
+            </a:r>
+            <a:r>
+              <a:rPr lang="fr-FR" b="1" dirty="0"/>
+              <a:t>version 2.0</a:t>
+            </a:r>
+            <a:r>
+              <a:rPr lang="fr-FR" dirty="0"/>
+              <a:t> de notre bibliothèque, nommée </a:t>
+            </a:r>
+            <a:r>
+              <a:rPr lang="fr-FR" b="1" dirty="0" err="1"/>
+              <a:t>Namespace</a:t>
+            </a:r>
+            <a:r>
+              <a:rPr lang="fr-FR" b="1" dirty="0"/>
+              <a:t> v2.0</a:t>
+            </a:r>
+            <a:r>
+              <a:rPr lang="fr-FR" dirty="0"/>
+              <a:t>, représente une étape majeure en intégrant les </a:t>
+            </a:r>
+            <a:r>
+              <a:rPr lang="fr-FR" b="1" dirty="0"/>
+              <a:t>principes fondamentaux du traitement d’image</a:t>
+            </a:r>
+            <a:r>
+              <a:rPr lang="fr-FR" dirty="0"/>
+              <a:t>, tels que :</a:t>
             </a:r>
           </a:p>
           <a:p>
-            <a:pPr marL="457200" lvl="1" indent="0" algn="just">
-              <a:lnSpc>
-                <a:spcPct val="150000"/>
-              </a:lnSpc>
-              <a:spcBef>
-                <a:spcPts val="600"/>
-              </a:spcBef>
-              <a:buFont typeface="Courier New" panose="02070309020205020404" pitchFamily="49" charset="0"/>
-              <a:buNone/>
+            <a:pPr>
+              <a:buFont typeface="Arial" panose="020B0604020202020204" pitchFamily="34" charset="0"/>
+              <a:buChar char="•"/>
             </a:pPr>
-            <a:endParaRPr lang="fr-FR" sz="1400" dirty="0">
-              <a:effectLst/>
-              <a:latin typeface="Times New Roman" panose="02020603050405020304" pitchFamily="18" charset="0"/>
-              <a:ea typeface="Calibri" panose="020F0502020204030204" pitchFamily="34" charset="0"/>
-              <a:cs typeface="Times New Roman" panose="02020603050405020304" pitchFamily="18" charset="0"/>
-            </a:endParaRPr>
+            <a:r>
+              <a:rPr lang="fr-FR" dirty="0"/>
+              <a:t>l’</a:t>
+            </a:r>
+            <a:r>
+              <a:rPr lang="fr-FR" b="1" dirty="0"/>
+              <a:t>addition d’images</a:t>
+            </a:r>
+            <a:r>
+              <a:rPr lang="fr-FR" dirty="0"/>
+              <a:t>,</a:t>
+            </a:r>
           </a:p>
           <a:p>
-            <a:pPr marL="742950" lvl="1" indent="-285750" algn="just">
-              <a:lnSpc>
-                <a:spcPct val="150000"/>
-              </a:lnSpc>
-              <a:spcAft>
-                <a:spcPts val="600"/>
-              </a:spcAft>
-              <a:buFont typeface="Courier New" panose="02070309020205020404" pitchFamily="49" charset="0"/>
-              <a:buChar char="o"/>
+            <a:pPr>
+              <a:buFont typeface="Arial" panose="020B0604020202020204" pitchFamily="34" charset="0"/>
+              <a:buChar char="•"/>
             </a:pPr>
             <a:r>
-              <a:rPr lang="fr-FR" sz="1400" dirty="0">
-                <a:effectLst/>
-                <a:latin typeface="Times New Roman" panose="02020603050405020304" pitchFamily="18" charset="0"/>
-                <a:ea typeface="Calibri" panose="020F0502020204030204" pitchFamily="34" charset="0"/>
-                <a:cs typeface="Times New Roman" panose="02020603050405020304" pitchFamily="18" charset="0"/>
-              </a:rPr>
-              <a:t>Si leurs dimensions sont différentes, l’image la plus petite est d’abord étendue par l’ajout des zéros (</a:t>
-            </a:r>
-            <a:r>
-              <a:rPr lang="fr-FR" sz="1400" dirty="0" err="1">
-                <a:effectLst/>
-                <a:latin typeface="Times New Roman" panose="02020603050405020304" pitchFamily="18" charset="0"/>
-                <a:ea typeface="Calibri" panose="020F0502020204030204" pitchFamily="34" charset="0"/>
-                <a:cs typeface="Times New Roman" panose="02020603050405020304" pitchFamily="18" charset="0"/>
-              </a:rPr>
-              <a:t>padding</a:t>
-            </a:r>
-            <a:r>
-              <a:rPr lang="fr-FR" sz="1400" dirty="0">
-                <a:effectLst/>
-                <a:latin typeface="Times New Roman" panose="02020603050405020304" pitchFamily="18" charset="0"/>
-                <a:ea typeface="Calibri" panose="020F0502020204030204" pitchFamily="34" charset="0"/>
-                <a:cs typeface="Times New Roman" panose="02020603050405020304" pitchFamily="18" charset="0"/>
-              </a:rPr>
-              <a:t>), pour correspondre à la taille de l’image la plus grande avant d’effectue l’addition. </a:t>
+              <a:rPr lang="fr-FR" dirty="0"/>
+              <a:t>l’application de </a:t>
+            </a:r>
+            <a:r>
+              <a:rPr lang="fr-FR" b="1" dirty="0"/>
+              <a:t>convolutions</a:t>
+            </a:r>
+            <a:r>
+              <a:rPr lang="fr-FR" dirty="0"/>
+              <a:t> (filtres spatiaux),</a:t>
             </a:r>
           </a:p>
           <a:p>
-            <a:endParaRPr lang="fr-FR" dirty="0"/>
+            <a:pPr>
+              <a:buFont typeface="Arial" panose="020B0604020202020204" pitchFamily="34" charset="0"/>
+              <a:buChar char="•"/>
+            </a:pPr>
+            <a:r>
+              <a:rPr lang="fr-FR" dirty="0"/>
+              <a:t>et le </a:t>
+            </a:r>
+            <a:r>
+              <a:rPr lang="fr-FR" b="1" dirty="0"/>
+              <a:t>calcul d’histogrammes</a:t>
+            </a:r>
+            <a:r>
+              <a:rPr lang="fr-FR" dirty="0"/>
+              <a:t>.</a:t>
+            </a:r>
           </a:p>
           <a:p>
             <a:pPr marL="0" marR="0" lvl="0" indent="0" algn="l" defTabSz="914400" rtl="0" eaLnBrk="1" fontAlgn="auto" latinLnBrk="0" hangingPunct="1">
@@ -854,46 +1270,32 @@
               <a:tabLst/>
               <a:defRPr/>
             </a:pPr>
-            <a:endParaRPr lang="fr-FR" sz="1200" dirty="0">
-              <a:solidFill>
-                <a:srgbClr val="0D0D0D"/>
-              </a:solidFill>
-              <a:effectLst/>
-              <a:latin typeface="Times New Roman" panose="02020603050405020304" pitchFamily="18" charset="0"/>
-              <a:ea typeface="Calibri" panose="020F0502020204030204" pitchFamily="34" charset="0"/>
-              <a:cs typeface="Times New Roman" panose="02020603050405020304" pitchFamily="18" charset="0"/>
-            </a:endParaRPr>
-          </a:p>
-          <a:p>
-            <a:pPr marL="0" marR="0" lvl="0" indent="0" algn="l" defTabSz="914400" rtl="0" eaLnBrk="1" fontAlgn="auto" latinLnBrk="0" hangingPunct="1">
-              <a:lnSpc>
-                <a:spcPct val="100000"/>
-              </a:lnSpc>
-              <a:spcBef>
-                <a:spcPts val="0"/>
-              </a:spcBef>
-              <a:spcAft>
-                <a:spcPts val="0"/>
-              </a:spcAft>
-              <a:buClrTx/>
-              <a:buSzTx/>
-              <a:buFontTx/>
-              <a:buNone/>
-              <a:tabLst/>
-              <a:defRPr/>
-            </a:pPr>
-            <a:endParaRPr lang="fr-FR" sz="1200" dirty="0">
-              <a:solidFill>
-                <a:srgbClr val="0D0D0D"/>
-              </a:solidFill>
-              <a:effectLst/>
-              <a:latin typeface="Times New Roman" panose="02020603050405020304" pitchFamily="18" charset="0"/>
-              <a:ea typeface="Calibri" panose="020F0502020204030204" pitchFamily="34" charset="0"/>
-              <a:cs typeface="Times New Roman" panose="02020603050405020304" pitchFamily="18" charset="0"/>
-            </a:endParaRPr>
-          </a:p>
-          <a:p>
-            <a:endParaRPr lang="fr-FR" dirty="0"/>
+            <a:r>
+              <a:rPr lang="fr-FR" dirty="0"/>
+              <a:t>Dans cette version, chaque traitement est implémenté sous la forme d’une </a:t>
+            </a:r>
+            <a:r>
+              <a:rPr lang="fr-FR" b="1" dirty="0"/>
+              <a:t>classe </a:t>
+            </a:r>
+            <a:r>
+              <a:rPr lang="fr-FR" b="1" dirty="0" err="1"/>
+              <a:t>template</a:t>
+            </a:r>
+            <a:r>
+              <a:rPr lang="fr-FR" dirty="0"/>
+              <a:t> dédiée, </a:t>
+            </a:r>
+            <a:r>
+              <a:rPr lang="fr-FR" dirty="0">
+                <a:solidFill>
+                  <a:schemeClr val="tx1"/>
+                </a:solidFill>
+                <a:latin typeface="Times New Roman" panose="02020603050405020304" pitchFamily="18" charset="0"/>
+                <a:cs typeface="Times New Roman" panose="02020603050405020304" pitchFamily="18" charset="0"/>
+              </a:rPr>
+              <a:t>. Ces classes héritent soit de la classe abstraite (class de base) Processing1, pour les traitements qui nécessitent une seule image en entrée, soit de la classe Processing2, pour les traitements qui nécessitent deux images en entrée</a:t>
+            </a:r>
           </a:p>
         </p:txBody>
       </p:sp>
@@ -914,7 +1316,7 @@
           <a:p>
             <a:fld id="{C7B300EB-8BAD-4183-8623-19644C4FEA4C}" type="slidenum">
               <a:rPr lang="fr-FR" smtClean="0"/>
-              <a:t>12</a:t>
+              <a:t>11</a:t>
             </a:fld>
             <a:endParaRPr lang="fr-FR"/>
           </a:p>
@@ -923,7 +1325,7 @@
     </p:spTree>
     <p:extLst>
       <p:ext uri="{BB962C8B-B14F-4D97-AF65-F5344CB8AC3E}">
-        <p14:creationId xmlns:p14="http://schemas.microsoft.com/office/powerpoint/2010/main" val="333193630"/>
+        <p14:creationId xmlns:p14="http://schemas.microsoft.com/office/powerpoint/2010/main" val="1373176085"/>
       </p:ext>
     </p:extLst>
   </p:cSld>
@@ -977,7 +1379,362 @@
           <a:bodyPr/>
           <a:lstStyle/>
           <a:p>
+            <a:pPr marL="457200" lvl="1" indent="0" algn="just">
+              <a:lnSpc>
+                <a:spcPct val="150000"/>
+              </a:lnSpc>
+              <a:spcBef>
+                <a:spcPts val="600"/>
+              </a:spcBef>
+              <a:buFont typeface="Courier New" panose="02070309020205020404" pitchFamily="49" charset="0"/>
+              <a:buNone/>
+            </a:pPr>
+            <a:r>
+              <a:rPr lang="fr-FR" sz="2800" dirty="0"/>
+              <a:t>Nous commençons par le </a:t>
+            </a:r>
+            <a:r>
+              <a:rPr lang="fr-FR" sz="2800" b="1" dirty="0"/>
+              <a:t>premier traitement</a:t>
+            </a:r>
+            <a:r>
+              <a:rPr lang="fr-FR" sz="2800" dirty="0"/>
+              <a:t> intégré dans cette version : </a:t>
+            </a:r>
+            <a:r>
+              <a:rPr lang="fr-FR" sz="2800" b="1" dirty="0"/>
+              <a:t>l’addition d’images, </a:t>
+            </a:r>
+            <a:r>
+              <a:rPr lang="fr-FR" sz="2800" dirty="0"/>
+              <a:t>e traitement est implémenté dans la classe </a:t>
+            </a:r>
+            <a:r>
+              <a:rPr lang="fr-FR" sz="2800" b="1" dirty="0" err="1"/>
+              <a:t>AdditionScalaire</a:t>
+            </a:r>
+            <a:r>
+              <a:rPr lang="fr-FR" sz="2800" dirty="0"/>
+              <a:t>, qui hérite de la classe abstraite AbstractProcessing2</a:t>
+            </a:r>
+          </a:p>
+          <a:p>
+            <a:pPr marL="457200" lvl="1" indent="0" algn="just">
+              <a:lnSpc>
+                <a:spcPct val="150000"/>
+              </a:lnSpc>
+              <a:spcBef>
+                <a:spcPts val="600"/>
+              </a:spcBef>
+              <a:buFont typeface="Courier New" panose="02070309020205020404" pitchFamily="49" charset="0"/>
+              <a:buNone/>
+            </a:pPr>
+            <a:r>
+              <a:rPr lang="fr-FR" sz="2800" dirty="0"/>
+              <a:t>L’objectif de cette classe est d’ajouter une valeur constante à chaque pixel de l’image, ce qui permet par exemple d’ajuster la luminosité de l’image de manière uniforme.</a:t>
+            </a:r>
+            <a:endParaRPr lang="fr-FR" sz="1800" dirty="0">
+              <a:solidFill>
+                <a:srgbClr val="0D0D0D"/>
+              </a:solidFill>
+              <a:effectLst/>
+              <a:latin typeface="Times New Roman" panose="02020603050405020304" pitchFamily="18" charset="0"/>
+              <a:ea typeface="Calibri" panose="020F0502020204030204" pitchFamily="34" charset="0"/>
+            </a:endParaRPr>
+          </a:p>
+          <a:p>
+            <a:pPr marL="457200" lvl="1" indent="0" algn="just">
+              <a:lnSpc>
+                <a:spcPct val="150000"/>
+              </a:lnSpc>
+              <a:spcBef>
+                <a:spcPts val="600"/>
+              </a:spcBef>
+              <a:buFont typeface="Courier New" panose="02070309020205020404" pitchFamily="49" charset="0"/>
+              <a:buNone/>
+            </a:pPr>
+            <a:endParaRPr lang="fr-FR" sz="1800" dirty="0">
+              <a:solidFill>
+                <a:srgbClr val="0D0D0D"/>
+              </a:solidFill>
+              <a:effectLst/>
+              <a:latin typeface="Times New Roman" panose="02020603050405020304" pitchFamily="18" charset="0"/>
+              <a:ea typeface="Calibri" panose="020F0502020204030204" pitchFamily="34" charset="0"/>
+            </a:endParaRPr>
+          </a:p>
+          <a:p>
+            <a:pPr marL="457200" lvl="1" indent="0" algn="just">
+              <a:lnSpc>
+                <a:spcPct val="150000"/>
+              </a:lnSpc>
+              <a:spcBef>
+                <a:spcPts val="600"/>
+              </a:spcBef>
+              <a:buFont typeface="Courier New" panose="02070309020205020404" pitchFamily="49" charset="0"/>
+              <a:buNone/>
+            </a:pPr>
+            <a:r>
+              <a:rPr lang="fr-FR" sz="2800" dirty="0"/>
+              <a:t>Le second cas d’utilisation concerne l’</a:t>
+            </a:r>
+            <a:r>
+              <a:rPr lang="fr-FR" sz="2800" b="1" dirty="0"/>
+              <a:t>addition de deux images</a:t>
+            </a:r>
+            <a:r>
+              <a:rPr lang="fr-FR" sz="2800" dirty="0"/>
+              <a:t>, implémentée dans la classe </a:t>
+            </a:r>
+            <a:r>
+              <a:rPr lang="fr-FR" sz="2800" b="1" dirty="0"/>
+              <a:t>Addition</a:t>
+            </a:r>
+            <a:r>
+              <a:rPr lang="fr-FR" sz="2800" dirty="0"/>
+              <a:t>, qui hérite de la classe abstraite </a:t>
+            </a:r>
+            <a:r>
+              <a:rPr lang="fr-FR" sz="2800" b="1" dirty="0"/>
+              <a:t>AbstractProcessing1</a:t>
+            </a:r>
+            <a:r>
+              <a:rPr lang="fr-FR" sz="1800" b="1" dirty="0">
+                <a:solidFill>
+                  <a:srgbClr val="0D0D0D"/>
+                </a:solidFill>
+                <a:effectLst/>
+                <a:latin typeface="Times New Roman" panose="02020603050405020304" pitchFamily="18" charset="0"/>
+                <a:ea typeface="Calibri" panose="020F0502020204030204" pitchFamily="34" charset="0"/>
+              </a:rPr>
+              <a:t>, </a:t>
+            </a:r>
+            <a:r>
+              <a:rPr lang="fr-FR" sz="2800" dirty="0"/>
+              <a:t>L’objectif est d’additionner deux images </a:t>
+            </a:r>
+            <a:r>
+              <a:rPr lang="fr-FR" sz="2800" b="1" dirty="0"/>
+              <a:t>pixel par pixel</a:t>
+            </a:r>
+            <a:r>
+              <a:rPr lang="fr-FR" sz="2800" dirty="0"/>
+              <a:t>, selon les règles suivantes :</a:t>
+            </a:r>
+          </a:p>
+          <a:p>
+            <a:pPr marL="742950" lvl="1" indent="-285750" algn="just">
+              <a:lnSpc>
+                <a:spcPct val="150000"/>
+              </a:lnSpc>
+              <a:spcAft>
+                <a:spcPts val="600"/>
+              </a:spcAft>
+              <a:buFont typeface="Courier New" panose="02070309020205020404" pitchFamily="49" charset="0"/>
+              <a:buChar char="o"/>
+            </a:pPr>
+            <a:r>
+              <a:rPr lang="fr-FR" sz="2000" b="1" dirty="0"/>
+              <a:t>Si les deux images ont les mêmes dimensions</a:t>
+            </a:r>
+            <a:r>
+              <a:rPr lang="fr-FR" sz="2000" dirty="0"/>
+              <a:t>, l’addition s’effectue directement, pixel par pixel, et le résultat est une image de même taille.</a:t>
+            </a:r>
             <a:endParaRPr lang="fr-FR" dirty="0"/>
+          </a:p>
+          <a:p>
+            <a:pPr marL="0" marR="0" lvl="0" indent="0" algn="l" defTabSz="914400" rtl="0" eaLnBrk="1" fontAlgn="auto" latinLnBrk="0" hangingPunct="1">
+              <a:lnSpc>
+                <a:spcPct val="100000"/>
+              </a:lnSpc>
+              <a:spcBef>
+                <a:spcPts val="0"/>
+              </a:spcBef>
+              <a:spcAft>
+                <a:spcPts val="0"/>
+              </a:spcAft>
+              <a:buClrTx/>
+              <a:buSzTx/>
+              <a:buFontTx/>
+              <a:buNone/>
+              <a:tabLst/>
+              <a:defRPr/>
+            </a:pPr>
+            <a:endParaRPr lang="fr-FR" sz="1200" dirty="0">
+              <a:solidFill>
+                <a:srgbClr val="0D0D0D"/>
+              </a:solidFill>
+              <a:effectLst/>
+              <a:latin typeface="Times New Roman" panose="02020603050405020304" pitchFamily="18" charset="0"/>
+              <a:ea typeface="Calibri" panose="020F0502020204030204" pitchFamily="34" charset="0"/>
+              <a:cs typeface="Times New Roman" panose="02020603050405020304" pitchFamily="18" charset="0"/>
+            </a:endParaRPr>
+          </a:p>
+          <a:p>
+            <a:pPr marL="628650" marR="0" lvl="1" indent="-171450" algn="l" defTabSz="914400" rtl="0" eaLnBrk="1" fontAlgn="auto" latinLnBrk="0" hangingPunct="1">
+              <a:lnSpc>
+                <a:spcPct val="100000"/>
+              </a:lnSpc>
+              <a:spcBef>
+                <a:spcPts val="0"/>
+              </a:spcBef>
+              <a:spcAft>
+                <a:spcPts val="0"/>
+              </a:spcAft>
+              <a:buClrTx/>
+              <a:buSzTx/>
+              <a:buFont typeface="Arial" panose="020B0604020202020204" pitchFamily="34" charset="0"/>
+              <a:buChar char="•"/>
+              <a:tabLst/>
+              <a:defRPr/>
+            </a:pPr>
+            <a:r>
+              <a:rPr lang="fr-FR" b="1" dirty="0"/>
+              <a:t>Si les dimensions sont différentes</a:t>
+            </a:r>
+            <a:r>
+              <a:rPr lang="fr-FR" dirty="0"/>
+              <a:t>, la plus petite des deux images est </a:t>
+            </a:r>
+            <a:r>
+              <a:rPr lang="fr-FR" b="1" dirty="0"/>
+              <a:t>étendue (</a:t>
+            </a:r>
+            <a:r>
+              <a:rPr lang="fr-FR" b="1" dirty="0" err="1"/>
+              <a:t>padding</a:t>
+            </a:r>
+            <a:r>
+              <a:rPr lang="fr-FR" b="1" dirty="0"/>
+              <a:t>)</a:t>
+            </a:r>
+            <a:r>
+              <a:rPr lang="fr-FR" dirty="0"/>
+              <a:t> en ajoutant des zéros autour, jusqu’à correspondre à la taille de la plus grande. Une fois les tailles uniformisées, l’addition pixel par pixel est réalisée.</a:t>
+            </a:r>
+            <a:endParaRPr lang="fr-FR" sz="1200" dirty="0">
+              <a:solidFill>
+                <a:srgbClr val="0D0D0D"/>
+              </a:solidFill>
+              <a:effectLst/>
+              <a:latin typeface="Times New Roman" panose="02020603050405020304" pitchFamily="18" charset="0"/>
+              <a:ea typeface="Calibri" panose="020F0502020204030204" pitchFamily="34" charset="0"/>
+              <a:cs typeface="Times New Roman" panose="02020603050405020304" pitchFamily="18" charset="0"/>
+            </a:endParaRPr>
+          </a:p>
+          <a:p>
+            <a:endParaRPr lang="fr-FR" dirty="0"/>
+          </a:p>
+        </p:txBody>
+      </p:sp>
+      <p:sp>
+        <p:nvSpPr>
+          <p:cNvPr id="4" name="Espace réservé du numéro de diapositive 3"/>
+          <p:cNvSpPr>
+            <a:spLocks noGrp="1"/>
+          </p:cNvSpPr>
+          <p:nvPr>
+            <p:ph type="sldNum" sz="quarter" idx="5"/>
+          </p:nvPr>
+        </p:nvSpPr>
+        <p:spPr/>
+        <p:txBody>
+          <a:bodyPr/>
+          <a:lstStyle/>
+          <a:p>
+            <a:fld id="{C7B300EB-8BAD-4183-8623-19644C4FEA4C}" type="slidenum">
+              <a:rPr lang="fr-FR" smtClean="0"/>
+              <a:t>12</a:t>
+            </a:fld>
+            <a:endParaRPr lang="fr-FR"/>
+          </a:p>
+        </p:txBody>
+      </p:sp>
+    </p:spTree>
+    <p:extLst>
+      <p:ext uri="{BB962C8B-B14F-4D97-AF65-F5344CB8AC3E}">
+        <p14:creationId xmlns:p14="http://schemas.microsoft.com/office/powerpoint/2010/main" val="333193630"/>
+      </p:ext>
+    </p:extLst>
+  </p:cSld>
+  <p:clrMapOvr>
+    <a:masterClrMapping/>
+  </p:clrMapOvr>
+</p:notes>
+</file>
+
+<file path=ppt/notesSlides/notesSlide13.xml><?xml version="1.0" encoding="utf-8"?>
+<p:notes xmlns:a="http://schemas.openxmlformats.org/drawingml/2006/main" xmlns:r="http://schemas.openxmlformats.org/officeDocument/2006/relationships" xmlns:p="http://schemas.openxmlformats.org/presentationml/2006/main">
+  <p:cSld>
+    <p:spTree>
+      <p:nvGrpSpPr>
+        <p:cNvPr id="1" name=""/>
+        <p:cNvGrpSpPr/>
+        <p:nvPr/>
+      </p:nvGrpSpPr>
+      <p:grpSpPr>
+        <a:xfrm>
+          <a:off x="0" y="0"/>
+          <a:ext cx="0" cy="0"/>
+          <a:chOff x="0" y="0"/>
+          <a:chExt cx="0" cy="0"/>
+        </a:xfrm>
+      </p:grpSpPr>
+      <p:sp>
+        <p:nvSpPr>
+          <p:cNvPr id="2" name="Espace réservé de l'image des diapositives 1"/>
+          <p:cNvSpPr>
+            <a:spLocks noGrp="1" noRot="1" noChangeAspect="1"/>
+          </p:cNvSpPr>
+          <p:nvPr>
+            <p:ph type="sldImg"/>
+          </p:nvPr>
+        </p:nvSpPr>
+        <p:spPr/>
+      </p:sp>
+      <p:sp>
+        <p:nvSpPr>
+          <p:cNvPr id="3" name="Espace réservé des notes 2"/>
+          <p:cNvSpPr>
+            <a:spLocks noGrp="1"/>
+          </p:cNvSpPr>
+          <p:nvPr>
+            <p:ph type="body" idx="1"/>
+          </p:nvPr>
+        </p:nvSpPr>
+        <p:spPr/>
+        <p:txBody>
+          <a:bodyPr/>
+          <a:lstStyle/>
+          <a:p>
+            <a:r>
+              <a:rPr lang="fr-FR" dirty="0"/>
+              <a:t>On passe au </a:t>
+            </a:r>
+            <a:r>
+              <a:rPr lang="fr-FR" dirty="0" err="1"/>
+              <a:t>deuxieme</a:t>
+            </a:r>
+            <a:r>
+              <a:rPr lang="fr-FR" dirty="0"/>
+              <a:t> traitement dans cette version c’est </a:t>
+            </a:r>
+            <a:r>
+              <a:rPr lang="fr-FR" dirty="0" err="1"/>
+              <a:t>egalisation</a:t>
+            </a:r>
+            <a:r>
+              <a:rPr lang="fr-FR" dirty="0"/>
+              <a:t> d’histogramme qui définit dans la </a:t>
+            </a:r>
+            <a:r>
+              <a:rPr lang="fr-FR" dirty="0" err="1"/>
+              <a:t>methjode</a:t>
+            </a:r>
+            <a:r>
+              <a:rPr lang="fr-FR" dirty="0"/>
+              <a:t> process()  </a:t>
+            </a:r>
           </a:p>
         </p:txBody>
       </p:sp>
@@ -1017,7 +1774,7 @@
 </p:notes>
 </file>
 
-<file path=ppt/notesSlides/notesSlide13.xml><?xml version="1.0" encoding="utf-8"?>
+<file path=ppt/notesSlides/notesSlide14.xml><?xml version="1.0" encoding="utf-8"?>
 <p:notes xmlns:a="http://schemas.openxmlformats.org/drawingml/2006/main" xmlns:r="http://schemas.openxmlformats.org/officeDocument/2006/relationships" xmlns:p="http://schemas.openxmlformats.org/presentationml/2006/main">
   <p:cSld>
     <p:spTree>
@@ -1470,7 +2227,7 @@
 </p:notes>
 </file>
 
-<file path=ppt/notesSlides/notesSlide14.xml><?xml version="1.0" encoding="utf-8"?>
+<file path=ppt/notesSlides/notesSlide15.xml><?xml version="1.0" encoding="utf-8"?>
 <p:notes xmlns:a="http://schemas.openxmlformats.org/drawingml/2006/main" xmlns:r="http://schemas.openxmlformats.org/officeDocument/2006/relationships" xmlns:p="http://schemas.openxmlformats.org/presentationml/2006/main">
   <p:cSld>
     <p:spTree>
@@ -2257,7 +3014,177 @@
           <a:bodyPr/>
           <a:lstStyle/>
           <a:p>
-            <a:endParaRPr lang="fr-FR" dirty="0"/>
+            <a:r>
+              <a:rPr lang="fr-FR" dirty="0"/>
+              <a:t>Donc, ma présentation s’effectuera selon le plan suivant :</a:t>
+            </a:r>
+          </a:p>
+          <a:p>
+            <a:r>
+              <a:rPr lang="fr-FR" dirty="0"/>
+              <a:t>Nous commencerons par une </a:t>
+            </a:r>
+            <a:r>
+              <a:rPr lang="fr-FR" b="1" dirty="0"/>
+              <a:t>introduction</a:t>
+            </a:r>
+            <a:r>
+              <a:rPr lang="fr-FR" dirty="0"/>
+              <a:t>.</a:t>
+            </a:r>
+            <a:br>
+              <a:rPr lang="fr-FR" dirty="0"/>
+            </a:br>
+            <a:r>
+              <a:rPr lang="fr-FR" dirty="0"/>
+              <a:t>Ensuite, nous présenterons le </a:t>
+            </a:r>
+            <a:r>
+              <a:rPr lang="fr-FR" b="1" dirty="0"/>
+              <a:t>projet et ses objectifs</a:t>
+            </a:r>
+            <a:r>
+              <a:rPr lang="fr-FR" dirty="0"/>
+              <a:t>.</a:t>
+            </a:r>
+          </a:p>
+          <a:p>
+            <a:r>
+              <a:rPr lang="fr-FR" dirty="0"/>
+              <a:t>Nous poursuivrons avec les </a:t>
+            </a:r>
+            <a:r>
+              <a:rPr lang="fr-FR" b="1" dirty="0"/>
+              <a:t>exercices appliqués en C++</a:t>
+            </a:r>
+            <a:r>
+              <a:rPr lang="fr-FR" dirty="0"/>
+              <a:t>, qui nous ont permis de consolider nos bases.</a:t>
+            </a:r>
+          </a:p>
+          <a:p>
+            <a:r>
+              <a:rPr lang="fr-FR" dirty="0"/>
+              <a:t>Puis, nous aborderons la </a:t>
+            </a:r>
+            <a:r>
+              <a:rPr lang="fr-FR" b="1" dirty="0"/>
+              <a:t>première version du </a:t>
+            </a:r>
+            <a:r>
+              <a:rPr lang="fr-FR" b="1" dirty="0" err="1"/>
+              <a:t>namespace</a:t>
+            </a:r>
+            <a:r>
+              <a:rPr lang="fr-FR" b="1" dirty="0"/>
+              <a:t> (v1.0)</a:t>
+            </a:r>
+            <a:r>
+              <a:rPr lang="fr-FR" dirty="0"/>
+              <a:t>, avec :</a:t>
+            </a:r>
+          </a:p>
+          <a:p>
+            <a:pPr>
+              <a:buFont typeface="Arial" panose="020B0604020202020204" pitchFamily="34" charset="0"/>
+              <a:buChar char="•"/>
+            </a:pPr>
+            <a:r>
+              <a:rPr lang="fr-FR" dirty="0"/>
+              <a:t>la </a:t>
+            </a:r>
+            <a:r>
+              <a:rPr lang="fr-FR" b="1" dirty="0"/>
+              <a:t>création d’images particulières</a:t>
+            </a:r>
+            <a:r>
+              <a:rPr lang="fr-FR" dirty="0"/>
+              <a:t>,</a:t>
+            </a:r>
+          </a:p>
+          <a:p>
+            <a:pPr>
+              <a:buFont typeface="Arial" panose="020B0604020202020204" pitchFamily="34" charset="0"/>
+              <a:buChar char="•"/>
+            </a:pPr>
+            <a:r>
+              <a:rPr lang="fr-FR" dirty="0"/>
+              <a:t>et l’</a:t>
+            </a:r>
+            <a:r>
+              <a:rPr lang="fr-FR" b="1" dirty="0"/>
+              <a:t>implémentation de plusieurs fonctions</a:t>
+            </a:r>
+            <a:r>
+              <a:rPr lang="fr-FR" dirty="0"/>
+              <a:t>.</a:t>
+            </a:r>
+          </a:p>
+          <a:p>
+            <a:r>
+              <a:rPr lang="fr-FR" dirty="0"/>
+              <a:t>Nous verrons ensuite les </a:t>
+            </a:r>
+            <a:r>
+              <a:rPr lang="fr-FR" b="1" dirty="0"/>
+              <a:t>résultats des tests de filtres LUT</a:t>
+            </a:r>
+            <a:r>
+              <a:rPr lang="fr-FR" dirty="0"/>
+              <a:t> sur différentes images.</a:t>
+            </a:r>
+          </a:p>
+          <a:p>
+            <a:r>
+              <a:rPr lang="fr-FR" dirty="0"/>
+              <a:t>Puis, nous passerons aux versions </a:t>
+            </a:r>
+            <a:r>
+              <a:rPr lang="fr-FR" b="1" dirty="0" err="1"/>
+              <a:t>namespace</a:t>
+            </a:r>
+            <a:r>
+              <a:rPr lang="fr-FR" b="1" dirty="0"/>
+              <a:t> v1.1</a:t>
+            </a:r>
+            <a:r>
+              <a:rPr lang="fr-FR" dirty="0"/>
+              <a:t>, ensuite </a:t>
+            </a:r>
+            <a:r>
+              <a:rPr lang="fr-FR" b="1" dirty="0" err="1"/>
+              <a:t>namespace</a:t>
+            </a:r>
+            <a:r>
+              <a:rPr lang="fr-FR" b="1" dirty="0"/>
+              <a:t> v2.0</a:t>
+            </a:r>
+            <a:r>
+              <a:rPr lang="fr-FR" dirty="0"/>
+              <a:t>, où seront présentés les </a:t>
+            </a:r>
+            <a:r>
+              <a:rPr lang="fr-FR" b="1" dirty="0"/>
+              <a:t>traitements d’images avancés</a:t>
+            </a:r>
+            <a:r>
+              <a:rPr lang="fr-FR" dirty="0"/>
+              <a:t>.</a:t>
+            </a:r>
+          </a:p>
+          <a:p>
+            <a:r>
+              <a:rPr lang="fr-FR" dirty="0"/>
+              <a:t>Et enfin, </a:t>
+            </a:r>
+            <a:r>
+              <a:rPr lang="fr-FR" b="1" dirty="0"/>
+              <a:t>nous terminerons par une conclusion et des perspectives</a:t>
+            </a:r>
+            <a:r>
+              <a:rPr lang="fr-FR" dirty="0"/>
+              <a:t> pour la suite de ce travail.</a:t>
+            </a:r>
           </a:p>
         </p:txBody>
       </p:sp>
@@ -2425,6 +3352,159 @@
           <a:bodyPr/>
           <a:lstStyle/>
           <a:p>
+            <a:r>
+              <a:rPr lang="fr-FR" dirty="0"/>
+              <a:t>Pour réaliser cette bibliothèque, nous avons suivi le processus suivant :</a:t>
+            </a:r>
+          </a:p>
+          <a:p>
+            <a:r>
+              <a:rPr lang="fr-FR" dirty="0"/>
+              <a:t>D’abord, nous avons commencé par pratiquer le langage C++ en retravaillant les bases à travers plusieurs exercices pratiques.</a:t>
+            </a:r>
+            <a:br>
+              <a:rPr lang="fr-FR" dirty="0"/>
+            </a:br>
+            <a:r>
+              <a:rPr lang="fr-FR" dirty="0"/>
+              <a:t>Cela nous a permis de mieux comprendre les fondements de la programmation, comme les </a:t>
+            </a:r>
+            <a:r>
+              <a:rPr lang="fr-FR" b="1" dirty="0"/>
+              <a:t>vecteurs</a:t>
+            </a:r>
+            <a:r>
+              <a:rPr lang="fr-FR" dirty="0"/>
+              <a:t>, les </a:t>
+            </a:r>
+            <a:r>
+              <a:rPr lang="fr-FR" b="1" dirty="0"/>
+              <a:t>fonctions </a:t>
+            </a:r>
+            <a:r>
+              <a:rPr lang="fr-FR" b="1" dirty="0" err="1"/>
+              <a:t>templates</a:t>
+            </a:r>
+            <a:r>
+              <a:rPr lang="fr-FR" dirty="0"/>
+              <a:t>, les </a:t>
+            </a:r>
+            <a:r>
+              <a:rPr lang="fr-FR" b="1" dirty="0"/>
+              <a:t>boucles</a:t>
+            </a:r>
+            <a:r>
+              <a:rPr lang="fr-FR" dirty="0"/>
+              <a:t>, ainsi que les concepts de </a:t>
+            </a:r>
+            <a:r>
+              <a:rPr lang="fr-FR" b="1" dirty="0"/>
+              <a:t>programmation orientée objet</a:t>
+            </a:r>
+            <a:r>
+              <a:rPr lang="fr-FR" dirty="0"/>
+              <a:t>.</a:t>
+            </a:r>
+          </a:p>
+          <a:p>
+            <a:r>
+              <a:rPr lang="fr-FR" dirty="0"/>
+              <a:t>Ensuite, nous avons développé la </a:t>
+            </a:r>
+            <a:r>
+              <a:rPr lang="fr-FR" b="1" dirty="0"/>
+              <a:t>première version de la bibliothèque</a:t>
+            </a:r>
+            <a:r>
+              <a:rPr lang="fr-FR" dirty="0"/>
+              <a:t>, appelée </a:t>
+            </a:r>
+            <a:r>
+              <a:rPr lang="fr-FR" b="1" dirty="0" err="1"/>
+              <a:t>namespace</a:t>
+            </a:r>
+            <a:r>
+              <a:rPr lang="fr-FR" b="1" dirty="0"/>
+              <a:t> v1.0</a:t>
+            </a:r>
+            <a:r>
+              <a:rPr lang="fr-FR" dirty="0"/>
+              <a:t>, qui posait les bases de la structure.</a:t>
+            </a:r>
+          </a:p>
+          <a:p>
+            <a:r>
+              <a:rPr lang="fr-FR" dirty="0"/>
+              <a:t>Par la suite, cette version a été </a:t>
+            </a:r>
+            <a:r>
+              <a:rPr lang="fr-FR" b="1" dirty="0"/>
+              <a:t>améliorée</a:t>
+            </a:r>
+            <a:r>
+              <a:rPr lang="fr-FR" dirty="0"/>
+              <a:t> pour devenir </a:t>
+            </a:r>
+            <a:r>
+              <a:rPr lang="fr-FR" b="1" dirty="0" err="1"/>
+              <a:t>namespace</a:t>
+            </a:r>
+            <a:r>
+              <a:rPr lang="fr-FR" b="1" dirty="0"/>
+              <a:t> v1.1</a:t>
+            </a:r>
+            <a:r>
+              <a:rPr lang="fr-FR" dirty="0"/>
+              <a:t>, en rendant le code plus </a:t>
+            </a:r>
+            <a:r>
+              <a:rPr lang="fr-FR" b="1" dirty="0"/>
+              <a:t>modulaire</a:t>
+            </a:r>
+            <a:r>
+              <a:rPr lang="fr-FR" dirty="0"/>
+              <a:t> et </a:t>
+            </a:r>
+            <a:r>
+              <a:rPr lang="fr-FR" b="1" dirty="0"/>
+              <a:t>réutilisable</a:t>
+            </a:r>
+            <a:r>
+              <a:rPr lang="fr-FR" dirty="0"/>
+              <a:t> grâce à une approche orientée objet.</a:t>
+            </a:r>
+          </a:p>
+          <a:p>
+            <a:r>
+              <a:rPr lang="fr-FR" dirty="0"/>
+              <a:t>Enfin, nous avons développé </a:t>
+            </a:r>
+            <a:r>
+              <a:rPr lang="fr-FR" b="1" dirty="0"/>
+              <a:t>la dernière version : </a:t>
+            </a:r>
+            <a:r>
+              <a:rPr lang="fr-FR" b="1" dirty="0" err="1"/>
+              <a:t>namespace</a:t>
+            </a:r>
+            <a:r>
+              <a:rPr lang="fr-FR" b="1" dirty="0"/>
+              <a:t> v2.0</a:t>
+            </a:r>
+            <a:r>
+              <a:rPr lang="fr-FR" dirty="0"/>
+              <a:t>, qui s’appuie sur les deux versions précédentes. Cette version permet d’</a:t>
+            </a:r>
+            <a:r>
+              <a:rPr lang="fr-FR" b="1" dirty="0"/>
+              <a:t>implémenter différents traitements sur les images</a:t>
+            </a:r>
+            <a:r>
+              <a:rPr lang="fr-FR" dirty="0"/>
+              <a:t>, de manière plus complète et plus efficace.</a:t>
+            </a:r>
+          </a:p>
+          <a:p>
             <a:endParaRPr lang="fr-FR" dirty="0"/>
           </a:p>
         </p:txBody>
@@ -2509,7 +3589,175 @@
           <a:bodyPr/>
           <a:lstStyle/>
           <a:p>
-            <a:endParaRPr lang="fr-FR"/>
+            <a:r>
+              <a:rPr lang="fr-FR" dirty="0"/>
+              <a:t>Comme mentionné précédemment, nous avons commencé par pratiquer le langage C++ à travers plusieurs exercices.</a:t>
+            </a:r>
+            <a:br>
+              <a:rPr lang="fr-FR" dirty="0"/>
+            </a:br>
+            <a:r>
+              <a:rPr lang="fr-FR" dirty="0"/>
+              <a:t>Nous avons exploré les </a:t>
+            </a:r>
+            <a:r>
+              <a:rPr lang="fr-FR" b="1" dirty="0"/>
+              <a:t>fonctions et classes </a:t>
+            </a:r>
+            <a:r>
+              <a:rPr lang="fr-FR" b="1" dirty="0" err="1"/>
+              <a:t>templates</a:t>
+            </a:r>
+            <a:r>
+              <a:rPr lang="fr-FR" dirty="0"/>
+              <a:t> pour manipuler des </a:t>
+            </a:r>
+            <a:r>
+              <a:rPr lang="fr-FR" b="1" dirty="0"/>
+              <a:t>types génériques</a:t>
+            </a:r>
+            <a:r>
+              <a:rPr lang="fr-FR" dirty="0"/>
+              <a:t>.</a:t>
+            </a:r>
+            <a:br>
+              <a:rPr lang="fr-FR" dirty="0"/>
+            </a:br>
+            <a:r>
+              <a:rPr lang="fr-FR" dirty="0"/>
+              <a:t>Nous avons également travaillé avec des </a:t>
+            </a:r>
+            <a:r>
+              <a:rPr lang="fr-FR" b="1" dirty="0"/>
+              <a:t>tableaux en C</a:t>
+            </a:r>
+            <a:r>
+              <a:rPr lang="fr-FR" dirty="0"/>
+              <a:t> et des </a:t>
+            </a:r>
+            <a:r>
+              <a:rPr lang="fr-FR" b="1" dirty="0"/>
+              <a:t>std::</a:t>
+            </a:r>
+            <a:r>
+              <a:rPr lang="fr-FR" b="1" dirty="0" err="1"/>
+              <a:t>vector</a:t>
+            </a:r>
+            <a:r>
+              <a:rPr lang="fr-FR" dirty="0"/>
+              <a:t>, en </a:t>
+            </a:r>
+            <a:r>
+              <a:rPr lang="fr-FR" b="1" dirty="0"/>
+              <a:t>allocation statique</a:t>
+            </a:r>
+            <a:r>
+              <a:rPr lang="fr-FR" dirty="0"/>
+              <a:t> et </a:t>
+            </a:r>
+            <a:r>
+              <a:rPr lang="fr-FR" b="1" dirty="0"/>
+              <a:t>dynamique</a:t>
+            </a:r>
+            <a:r>
+              <a:rPr lang="fr-FR" dirty="0"/>
+              <a:t>, avec ou sans utilisation de </a:t>
+            </a:r>
+            <a:r>
+              <a:rPr lang="fr-FR" b="1" dirty="0" err="1"/>
+              <a:t>namespace</a:t>
+            </a:r>
+            <a:r>
+              <a:rPr lang="fr-FR" dirty="0"/>
+              <a:t>.</a:t>
+            </a:r>
+          </a:p>
+          <a:p>
+            <a:r>
+              <a:rPr lang="fr-FR" dirty="0"/>
+              <a:t>Ensuite, nous nous sommes exercés à la </a:t>
+            </a:r>
+            <a:r>
+              <a:rPr lang="fr-FR" b="1" dirty="0"/>
+              <a:t>programmation orientée objet</a:t>
+            </a:r>
+            <a:r>
+              <a:rPr lang="fr-FR" dirty="0"/>
+              <a:t>, afin de bien comprendre des notions clés comme l’</a:t>
+            </a:r>
+            <a:r>
+              <a:rPr lang="fr-FR" b="1" dirty="0"/>
+              <a:t>héritage</a:t>
+            </a:r>
+            <a:r>
+              <a:rPr lang="fr-FR" dirty="0"/>
+              <a:t>, la </a:t>
+            </a:r>
+            <a:r>
+              <a:rPr lang="fr-FR" b="1" dirty="0"/>
+              <a:t>composition</a:t>
+            </a:r>
+            <a:r>
+              <a:rPr lang="fr-FR" dirty="0"/>
+              <a:t>, l’</a:t>
+            </a:r>
+            <a:r>
+              <a:rPr lang="fr-FR" b="1" dirty="0"/>
+              <a:t>encapsulation</a:t>
+            </a:r>
+            <a:r>
+              <a:rPr lang="fr-FR" dirty="0"/>
+              <a:t>, le </a:t>
+            </a:r>
+            <a:r>
+              <a:rPr lang="fr-FR" b="1" dirty="0"/>
+              <a:t>polymorphisme</a:t>
+            </a:r>
+            <a:r>
+              <a:rPr lang="fr-FR" dirty="0"/>
+              <a:t>, ainsi que la </a:t>
+            </a:r>
+            <a:r>
+              <a:rPr lang="fr-FR" b="1" dirty="0"/>
+              <a:t>surcharge de méthodes</a:t>
+            </a:r>
+            <a:r>
+              <a:rPr lang="fr-FR" dirty="0"/>
+              <a:t> et d’</a:t>
+            </a:r>
+            <a:r>
+              <a:rPr lang="fr-FR" b="1" dirty="0"/>
+              <a:t>opérateurs</a:t>
+            </a:r>
+            <a:r>
+              <a:rPr lang="fr-FR" dirty="0"/>
+              <a:t>.</a:t>
+            </a:r>
+          </a:p>
+          <a:p>
+            <a:r>
+              <a:rPr lang="fr-FR" dirty="0"/>
+              <a:t>Enfin, nous avons approfondi l’utilisation des </a:t>
+            </a:r>
+            <a:r>
+              <a:rPr lang="fr-FR" b="1" dirty="0"/>
+              <a:t>classes génériques</a:t>
+            </a:r>
+            <a:r>
+              <a:rPr lang="fr-FR" dirty="0"/>
+              <a:t> en exploitant les </a:t>
+            </a:r>
+            <a:r>
+              <a:rPr lang="fr-FR" b="1" dirty="0" err="1"/>
+              <a:t>templates</a:t>
+            </a:r>
+            <a:r>
+              <a:rPr lang="fr-FR" dirty="0"/>
+              <a:t>.</a:t>
+            </a:r>
+          </a:p>
+          <a:p>
+            <a:endParaRPr lang="fr-FR" dirty="0"/>
           </a:p>
         </p:txBody>
       </p:sp>
@@ -2530,7 +3778,7 @@
           <a:p>
             <a:fld id="{C7B300EB-8BAD-4183-8623-19644C4FEA4C}" type="slidenum">
               <a:rPr lang="fr-FR" smtClean="0"/>
-              <a:t>6</a:t>
+              <a:t>5</a:t>
             </a:fld>
             <a:endParaRPr lang="fr-FR"/>
           </a:p>
@@ -2539,7 +3787,7 @@
     </p:spTree>
     <p:extLst>
       <p:ext uri="{BB962C8B-B14F-4D97-AF65-F5344CB8AC3E}">
-        <p14:creationId xmlns:p14="http://schemas.microsoft.com/office/powerpoint/2010/main" val="3962796333"/>
+        <p14:creationId xmlns:p14="http://schemas.microsoft.com/office/powerpoint/2010/main" val="1709622893"/>
       </p:ext>
     </p:extLst>
   </p:cSld>
@@ -2593,7 +3841,10 @@
           <a:bodyPr/>
           <a:lstStyle/>
           <a:p>
-            <a:endParaRPr lang="fr-FR" dirty="0"/>
+            <a:r>
+              <a:rPr lang="fr-FR" dirty="0"/>
+              <a:t>On passe maintenant à la première version de notre bibliothèque </a:t>
+            </a:r>
           </a:p>
         </p:txBody>
       </p:sp>
@@ -2614,7 +3865,7 @@
           <a:p>
             <a:fld id="{C7B300EB-8BAD-4183-8623-19644C4FEA4C}" type="slidenum">
               <a:rPr lang="fr-FR" smtClean="0"/>
-              <a:t>7</a:t>
+              <a:t>6</a:t>
             </a:fld>
             <a:endParaRPr lang="fr-FR"/>
           </a:p>
@@ -2623,7 +3874,7 @@
     </p:spTree>
     <p:extLst>
       <p:ext uri="{BB962C8B-B14F-4D97-AF65-F5344CB8AC3E}">
-        <p14:creationId xmlns:p14="http://schemas.microsoft.com/office/powerpoint/2010/main" val="1042782760"/>
+        <p14:creationId xmlns:p14="http://schemas.microsoft.com/office/powerpoint/2010/main" val="3962796333"/>
       </p:ext>
     </p:extLst>
   </p:cSld>
@@ -2679,23 +3930,331 @@
           <a:p>
             <a:r>
               <a:rPr lang="fr-FR" dirty="0"/>
-              <a:t>Dans </a:t>
+              <a:t>Dans cette bibliothèque, nous avons commencé par créer différentes images spécifiques, telles que:</a:t>
+            </a:r>
+          </a:p>
+          <a:p>
+            <a:endParaRPr lang="fr-FR" dirty="0"/>
+          </a:p>
+          <a:p>
+            <a:pPr marL="0" marR="0" lvl="0" indent="0" algn="l" defTabSz="914400" rtl="0" eaLnBrk="1" fontAlgn="auto" latinLnBrk="0" hangingPunct="1">
+              <a:lnSpc>
+                <a:spcPct val="100000"/>
+              </a:lnSpc>
+              <a:spcBef>
+                <a:spcPts val="0"/>
+              </a:spcBef>
+              <a:spcAft>
+                <a:spcPts val="0"/>
+              </a:spcAft>
+              <a:buClrTx/>
+              <a:buSzTx/>
+              <a:buFontTx/>
+              <a:buNone/>
+              <a:tabLst/>
+              <a:defRPr/>
+            </a:pPr>
+            <a:r>
+              <a:rPr lang="fr-FR" dirty="0"/>
+              <a:t>une image blanche =&gt; </a:t>
+            </a:r>
+            <a:r>
+              <a:rPr lang="en-US" b="1" dirty="0">
+                <a:solidFill>
+                  <a:srgbClr val="4EC9B0"/>
+                </a:solidFill>
+                <a:effectLst/>
+                <a:latin typeface="Consolas" panose="020B0609020204030204" pitchFamily="49" charset="0"/>
+              </a:rPr>
+              <a:t>std</a:t>
+            </a:r>
+            <a:r>
+              <a:rPr lang="en-US" b="1" dirty="0">
+                <a:solidFill>
+                  <a:srgbClr val="CCCCCC"/>
+                </a:solidFill>
+                <a:effectLst/>
+                <a:latin typeface="Consolas" panose="020B0609020204030204" pitchFamily="49" charset="0"/>
+              </a:rPr>
+              <a:t>::</a:t>
+            </a:r>
+            <a:r>
+              <a:rPr lang="en-US" b="1" dirty="0" err="1">
+                <a:solidFill>
+                  <a:srgbClr val="4EC9B0"/>
+                </a:solidFill>
+                <a:effectLst/>
+                <a:latin typeface="Consolas" panose="020B0609020204030204" pitchFamily="49" charset="0"/>
+              </a:rPr>
+              <a:t>numeric_limits</a:t>
+            </a:r>
+            <a:r>
+              <a:rPr lang="en-US" b="1" dirty="0">
+                <a:solidFill>
+                  <a:srgbClr val="CCCCCC"/>
+                </a:solidFill>
+                <a:effectLst/>
+                <a:latin typeface="Consolas" panose="020B0609020204030204" pitchFamily="49" charset="0"/>
+              </a:rPr>
+              <a:t>&lt;</a:t>
+            </a:r>
+            <a:r>
+              <a:rPr lang="en-US" b="1" dirty="0">
+                <a:solidFill>
+                  <a:srgbClr val="4EC9B0"/>
+                </a:solidFill>
+                <a:effectLst/>
+                <a:latin typeface="Consolas" panose="020B0609020204030204" pitchFamily="49" charset="0"/>
+              </a:rPr>
+              <a:t>T</a:t>
+            </a:r>
+            <a:r>
+              <a:rPr lang="en-US" b="1" dirty="0">
+                <a:solidFill>
+                  <a:srgbClr val="CCCCCC"/>
+                </a:solidFill>
+                <a:effectLst/>
+                <a:latin typeface="Consolas" panose="020B0609020204030204" pitchFamily="49" charset="0"/>
+              </a:rPr>
+              <a:t>&gt;::</a:t>
+            </a:r>
+            <a:r>
+              <a:rPr lang="en-US" b="1" dirty="0">
+                <a:solidFill>
+                  <a:srgbClr val="DCDCAA"/>
+                </a:solidFill>
+                <a:effectLst/>
+                <a:latin typeface="Consolas" panose="020B0609020204030204" pitchFamily="49" charset="0"/>
+              </a:rPr>
+              <a:t>max</a:t>
+            </a:r>
+            <a:r>
+              <a:rPr lang="en-US" b="1" dirty="0">
+                <a:solidFill>
+                  <a:srgbClr val="CCCCCC"/>
+                </a:solidFill>
+                <a:effectLst/>
+                <a:latin typeface="Consolas" panose="020B0609020204030204" pitchFamily="49" charset="0"/>
+              </a:rPr>
+              <a:t>() </a:t>
+            </a:r>
+            <a:r>
+              <a:rPr lang="fr-FR" dirty="0"/>
+              <a:t>r</a:t>
+            </a:r>
+            <a:r>
+              <a:rPr lang="fr-FR" b="0" dirty="0">
+                <a:solidFill>
+                  <a:srgbClr val="6A9955"/>
+                </a:solidFill>
+                <a:effectLst/>
+                <a:latin typeface="Consolas" panose="020B0609020204030204" pitchFamily="49" charset="0"/>
+              </a:rPr>
+              <a:t>etourne la plus grande valeur possible que peut prendre un type numérique T </a:t>
+            </a:r>
+            <a:endParaRPr lang="fr-FR" b="0" dirty="0">
+              <a:solidFill>
+                <a:srgbClr val="CCCCCC"/>
+              </a:solidFill>
+              <a:effectLst/>
+              <a:latin typeface="Consolas" panose="020B0609020204030204" pitchFamily="49" charset="0"/>
+            </a:endParaRPr>
+          </a:p>
+          <a:p>
+            <a:endParaRPr lang="fr-FR" dirty="0"/>
+          </a:p>
+          <a:p>
+            <a:pPr marL="0" marR="0" lvl="0" indent="0" algn="l" defTabSz="914400" rtl="0" eaLnBrk="1" fontAlgn="auto" latinLnBrk="0" hangingPunct="1">
+              <a:lnSpc>
+                <a:spcPct val="100000"/>
+              </a:lnSpc>
+              <a:spcBef>
+                <a:spcPts val="0"/>
+              </a:spcBef>
+              <a:spcAft>
+                <a:spcPts val="0"/>
+              </a:spcAft>
+              <a:buClrTx/>
+              <a:buSzTx/>
+              <a:buFontTx/>
+              <a:buNone/>
+              <a:tabLst/>
+              <a:defRPr/>
+            </a:pPr>
+            <a:r>
+              <a:rPr lang="fr-FR" dirty="0"/>
+              <a:t>une image en damier =&gt; </a:t>
+            </a:r>
+            <a:r>
+              <a:rPr lang="fr-FR" b="0" dirty="0">
+                <a:solidFill>
+                  <a:srgbClr val="6A9955"/>
+                </a:solidFill>
+                <a:effectLst/>
+                <a:latin typeface="Consolas" panose="020B0609020204030204" pitchFamily="49" charset="0"/>
+              </a:rPr>
+              <a:t>si l'indice x / taille de la case modulo 2 == a l'indice y / taille de case  modulo 2 donc la case est blanc  remplace par 255</a:t>
+            </a:r>
+            <a:endParaRPr lang="fr-FR" b="0" dirty="0">
+              <a:solidFill>
+                <a:srgbClr val="CCCCCC"/>
+              </a:solidFill>
+              <a:effectLst/>
+              <a:latin typeface="Consolas" panose="020B0609020204030204" pitchFamily="49" charset="0"/>
+            </a:endParaRPr>
+          </a:p>
+          <a:p>
+            <a:endParaRPr lang="fr-FR" dirty="0"/>
+          </a:p>
+          <a:p>
+            <a:r>
+              <a:rPr lang="fr-FR" dirty="0"/>
+              <a:t>et une image sinusoïdale. =&gt; </a:t>
+            </a:r>
+          </a:p>
+        </p:txBody>
+      </p:sp>
+      <p:sp>
+        <p:nvSpPr>
+          <p:cNvPr id="4" name="Espace réservé du numéro de diapositive 3"/>
+          <p:cNvSpPr>
+            <a:spLocks noGrp="1"/>
+          </p:cNvSpPr>
+          <p:nvPr>
+            <p:ph type="sldNum" sz="quarter" idx="5"/>
+          </p:nvPr>
+        </p:nvSpPr>
+        <p:spPr/>
+        <p:txBody>
+          <a:bodyPr/>
+          <a:lstStyle/>
+          <a:p>
+            <a:fld id="{C7B300EB-8BAD-4183-8623-19644C4FEA4C}" type="slidenum">
+              <a:rPr lang="fr-FR" smtClean="0"/>
+              <a:t>7</a:t>
+            </a:fld>
+            <a:endParaRPr lang="fr-FR"/>
+          </a:p>
+        </p:txBody>
+      </p:sp>
+    </p:spTree>
+    <p:extLst>
+      <p:ext uri="{BB962C8B-B14F-4D97-AF65-F5344CB8AC3E}">
+        <p14:creationId xmlns:p14="http://schemas.microsoft.com/office/powerpoint/2010/main" val="1042782760"/>
+      </p:ext>
+    </p:extLst>
+  </p:cSld>
+  <p:clrMapOvr>
+    <a:masterClrMapping/>
+  </p:clrMapOvr>
+</p:notes>
+</file>
+
+<file path=ppt/notesSlides/notesSlide8.xml><?xml version="1.0" encoding="utf-8"?>
+<p:notes xmlns:a="http://schemas.openxmlformats.org/drawingml/2006/main" xmlns:r="http://schemas.openxmlformats.org/officeDocument/2006/relationships" xmlns:p="http://schemas.openxmlformats.org/presentationml/2006/main">
+  <p:cSld>
+    <p:spTree>
+      <p:nvGrpSpPr>
+        <p:cNvPr id="1" name=""/>
+        <p:cNvGrpSpPr/>
+        <p:nvPr/>
+      </p:nvGrpSpPr>
+      <p:grpSpPr>
+        <a:xfrm>
+          <a:off x="0" y="0"/>
+          <a:ext cx="0" cy="0"/>
+          <a:chOff x="0" y="0"/>
+          <a:chExt cx="0" cy="0"/>
+        </a:xfrm>
+      </p:grpSpPr>
+      <p:sp>
+        <p:nvSpPr>
+          <p:cNvPr id="2" name="Espace réservé de l'image des diapositives 1"/>
+          <p:cNvSpPr>
+            <a:spLocks noGrp="1" noRot="1" noChangeAspect="1"/>
+          </p:cNvSpPr>
+          <p:nvPr>
+            <p:ph type="sldImg"/>
+          </p:nvPr>
+        </p:nvSpPr>
+        <p:spPr/>
+      </p:sp>
+      <p:sp>
+        <p:nvSpPr>
+          <p:cNvPr id="3" name="Espace réservé des notes 2"/>
+          <p:cNvSpPr>
+            <a:spLocks noGrp="1"/>
+          </p:cNvSpPr>
+          <p:nvPr>
+            <p:ph type="body" idx="1"/>
+          </p:nvPr>
+        </p:nvSpPr>
+        <p:spPr/>
+        <p:txBody>
+          <a:bodyPr/>
+          <a:lstStyle/>
+          <a:p>
+            <a:r>
+              <a:rPr lang="fr-FR" dirty="0"/>
+              <a:t>Ensuite, nous avons développé plusieurs fonctions destinées au traitement d’image, telles que :</a:t>
+            </a:r>
+          </a:p>
+          <a:p>
+            <a:pPr>
+              <a:buFont typeface="Arial" panose="020B0604020202020204" pitchFamily="34" charset="0"/>
+              <a:buChar char="•"/>
+            </a:pPr>
+            <a:r>
+              <a:rPr lang="fr-FR" dirty="0"/>
+              <a:t>la lecture et l’écriture de fichiers .</a:t>
             </a:r>
             <a:r>
               <a:rPr lang="fr-FR" dirty="0" err="1"/>
-              <a:t>namecpace</a:t>
+              <a:t>raw</a:t>
             </a:r>
             <a:r>
               <a:rPr lang="fr-FR" dirty="0"/>
-              <a:t> v1,1 nous allons implémenté des fonctions </a:t>
-            </a:r>
-            <a:r>
-              <a:rPr lang="fr-FR" dirty="0" err="1"/>
-              <a:t>telque</a:t>
-            </a:r>
+              <a:t> ; permettant d’accéder aux données brutes et de les sauvegarder sans perte d'information.</a:t>
+            </a:r>
+          </a:p>
+          <a:p>
+            <a:pPr>
+              <a:buFont typeface="Arial" panose="020B0604020202020204" pitchFamily="34" charset="0"/>
+              <a:buChar char="•"/>
+            </a:pPr>
             <a:r>
               <a:rPr lang="fr-FR" dirty="0"/>
-              <a:t> : </a:t>
+              <a:t>la conversion d’une image d’un type à un autre ; </a:t>
+            </a:r>
+          </a:p>
+          <a:p>
+            <a:pPr>
+              <a:buFont typeface="Arial" panose="020B0604020202020204" pitchFamily="34" charset="0"/>
+              <a:buChar char="•"/>
+            </a:pPr>
+            <a:r>
+              <a:rPr lang="fr-FR" dirty="0"/>
+              <a:t>la transformation d’une image RGB en niveaux de gris ;</a:t>
+            </a:r>
+          </a:p>
+          <a:p>
+            <a:pPr>
+              <a:buFont typeface="Arial" panose="020B0604020202020204" pitchFamily="34" charset="0"/>
+              <a:buChar char="•"/>
+            </a:pPr>
+            <a:r>
+              <a:rPr lang="fr-FR" dirty="0"/>
+              <a:t>le chargement de fichiers LUT ;</a:t>
+            </a:r>
+          </a:p>
+          <a:p>
+            <a:pPr>
+              <a:buFont typeface="Arial" panose="020B0604020202020204" pitchFamily="34" charset="0"/>
+              <a:buChar char="•"/>
+            </a:pPr>
+            <a:r>
+              <a:rPr lang="fr-FR" dirty="0"/>
+              <a:t>et l’application de fausses couleurs à l’aide de LUT.</a:t>
             </a:r>
           </a:p>
         </p:txBody>
@@ -2736,7 +4295,7 @@
 </p:notes>
 </file>
 
-<file path=ppt/notesSlides/notesSlide8.xml><?xml version="1.0" encoding="utf-8"?>
+<file path=ppt/notesSlides/notesSlide9.xml><?xml version="1.0" encoding="utf-8"?>
 <p:notes xmlns:a="http://schemas.openxmlformats.org/drawingml/2006/main" xmlns:r="http://schemas.openxmlformats.org/officeDocument/2006/relationships" xmlns:p="http://schemas.openxmlformats.org/presentationml/2006/main">
   <p:cSld>
     <p:spTree>
@@ -2842,475 +4401,6 @@
     <p:extLst>
       <p:ext uri="{BB962C8B-B14F-4D97-AF65-F5344CB8AC3E}">
         <p14:creationId xmlns:p14="http://schemas.microsoft.com/office/powerpoint/2010/main" val="3173819853"/>
-      </p:ext>
-    </p:extLst>
-  </p:cSld>
-  <p:clrMapOvr>
-    <a:masterClrMapping/>
-  </p:clrMapOvr>
-</p:notes>
-</file>
-
-<file path=ppt/notesSlides/notesSlide9.xml><?xml version="1.0" encoding="utf-8"?>
-<p:notes xmlns:a="http://schemas.openxmlformats.org/drawingml/2006/main" xmlns:r="http://schemas.openxmlformats.org/officeDocument/2006/relationships" xmlns:p="http://schemas.openxmlformats.org/presentationml/2006/main">
-  <p:cSld>
-    <p:spTree>
-      <p:nvGrpSpPr>
-        <p:cNvPr id="1" name=""/>
-        <p:cNvGrpSpPr/>
-        <p:nvPr/>
-      </p:nvGrpSpPr>
-      <p:grpSpPr>
-        <a:xfrm>
-          <a:off x="0" y="0"/>
-          <a:ext cx="0" cy="0"/>
-          <a:chOff x="0" y="0"/>
-          <a:chExt cx="0" cy="0"/>
-        </a:xfrm>
-      </p:grpSpPr>
-      <p:sp>
-        <p:nvSpPr>
-          <p:cNvPr id="2" name="Espace réservé de l'image des diapositives 1"/>
-          <p:cNvSpPr>
-            <a:spLocks noGrp="1" noRot="1" noChangeAspect="1"/>
-          </p:cNvSpPr>
-          <p:nvPr>
-            <p:ph type="sldImg"/>
-          </p:nvPr>
-        </p:nvSpPr>
-        <p:spPr/>
-      </p:sp>
-      <p:sp>
-        <p:nvSpPr>
-          <p:cNvPr id="3" name="Espace réservé des notes 2"/>
-          <p:cNvSpPr>
-            <a:spLocks noGrp="1"/>
-          </p:cNvSpPr>
-          <p:nvPr>
-            <p:ph type="body" idx="1"/>
-          </p:nvPr>
-        </p:nvSpPr>
-        <p:spPr/>
-        <p:txBody>
-          <a:bodyPr/>
-          <a:lstStyle/>
-          <a:p>
-            <a:pPr marL="171450" indent="-171450">
-              <a:buFont typeface="Arial" panose="020B0604020202020204" pitchFamily="34" charset="0"/>
-              <a:buChar char="•"/>
-            </a:pPr>
-            <a:r>
-              <a:rPr lang="fr-FR" sz="1800" b="1" i="1" dirty="0">
-                <a:solidFill>
-                  <a:srgbClr val="0D0D0D"/>
-                </a:solidFill>
-                <a:effectLst/>
-                <a:latin typeface="Times New Roman" panose="02020603050405020304" pitchFamily="18" charset="0"/>
-                <a:ea typeface="Calibri" panose="020F0502020204030204" pitchFamily="34" charset="0"/>
-              </a:rPr>
-              <a:t>La class Image</a:t>
-            </a:r>
-            <a:r>
-              <a:rPr lang="fr-FR" sz="1800" dirty="0">
-                <a:solidFill>
-                  <a:srgbClr val="0D0D0D"/>
-                </a:solidFill>
-                <a:effectLst/>
-                <a:latin typeface="Times New Roman" panose="02020603050405020304" pitchFamily="18" charset="0"/>
-                <a:ea typeface="Calibri" panose="020F0502020204030204" pitchFamily="34" charset="0"/>
-              </a:rPr>
-              <a:t>, qui gère les opérations de base (allocation d’image, création des images, lecture/écriture des fichier brut, conversion de type à un autre)</a:t>
-            </a:r>
-          </a:p>
-          <a:p>
-            <a:pPr algn="just">
-              <a:lnSpc>
-                <a:spcPct val="150000"/>
-              </a:lnSpc>
-              <a:spcBef>
-                <a:spcPts val="600"/>
-              </a:spcBef>
-            </a:pPr>
-            <a:r>
-              <a:rPr lang="fr-FR" sz="1800" dirty="0">
-                <a:solidFill>
-                  <a:srgbClr val="0D0D0D"/>
-                </a:solidFill>
-                <a:effectLst/>
-                <a:latin typeface="Times New Roman" panose="02020603050405020304" pitchFamily="18" charset="0"/>
-                <a:ea typeface="Calibri" panose="020F0502020204030204" pitchFamily="34" charset="0"/>
-                <a:cs typeface="Times New Roman" panose="02020603050405020304" pitchFamily="18" charset="0"/>
-              </a:rPr>
-              <a:t>La class </a:t>
-            </a:r>
-            <a:r>
-              <a:rPr lang="fr-FR" sz="1800" b="1" i="1" dirty="0" err="1">
-                <a:solidFill>
-                  <a:srgbClr val="0D0D0D"/>
-                </a:solidFill>
-                <a:effectLst/>
-                <a:latin typeface="Times New Roman" panose="02020603050405020304" pitchFamily="18" charset="0"/>
-                <a:ea typeface="Calibri" panose="020F0502020204030204" pitchFamily="34" charset="0"/>
-                <a:cs typeface="Times New Roman" panose="02020603050405020304" pitchFamily="18" charset="0"/>
-              </a:rPr>
-              <a:t>ImageRGB</a:t>
-            </a:r>
-            <a:r>
-              <a:rPr lang="fr-FR" sz="1800" dirty="0">
-                <a:solidFill>
-                  <a:srgbClr val="0D0D0D"/>
-                </a:solidFill>
-                <a:effectLst/>
-                <a:latin typeface="Times New Roman" panose="02020603050405020304" pitchFamily="18" charset="0"/>
-                <a:ea typeface="Calibri" panose="020F0502020204030204" pitchFamily="34" charset="0"/>
-                <a:cs typeface="Times New Roman" panose="02020603050405020304" pitchFamily="18" charset="0"/>
-              </a:rPr>
-              <a:t> est une class dérivé de la class </a:t>
-            </a:r>
-            <a:r>
-              <a:rPr lang="fr-FR" sz="1800" b="1" i="1" dirty="0">
-                <a:solidFill>
-                  <a:srgbClr val="0D0D0D"/>
-                </a:solidFill>
-                <a:effectLst/>
-                <a:latin typeface="Times New Roman" panose="02020603050405020304" pitchFamily="18" charset="0"/>
-                <a:ea typeface="Calibri" panose="020F0502020204030204" pitchFamily="34" charset="0"/>
-                <a:cs typeface="Times New Roman" panose="02020603050405020304" pitchFamily="18" charset="0"/>
-              </a:rPr>
-              <a:t>Image </a:t>
-            </a:r>
-            <a:r>
-              <a:rPr lang="fr-FR" sz="1800" dirty="0">
-                <a:solidFill>
-                  <a:srgbClr val="0D0D0D"/>
-                </a:solidFill>
-                <a:effectLst/>
-                <a:latin typeface="Times New Roman" panose="02020603050405020304" pitchFamily="18" charset="0"/>
-                <a:ea typeface="Calibri" panose="020F0502020204030204" pitchFamily="34" charset="0"/>
-                <a:cs typeface="Times New Roman" panose="02020603050405020304" pitchFamily="18" charset="0"/>
-              </a:rPr>
-              <a:t>conçue pour gérer les images en couleurs </a:t>
-            </a:r>
-            <a:r>
-              <a:rPr lang="fr-FR" sz="1800" b="1" i="1" dirty="0">
-                <a:solidFill>
-                  <a:srgbClr val="0D0D0D"/>
-                </a:solidFill>
-                <a:effectLst/>
-                <a:latin typeface="Times New Roman" panose="02020603050405020304" pitchFamily="18" charset="0"/>
-                <a:ea typeface="Calibri" panose="020F0502020204030204" pitchFamily="34" charset="0"/>
-                <a:cs typeface="Times New Roman" panose="02020603050405020304" pitchFamily="18" charset="0"/>
-              </a:rPr>
-              <a:t>RGB</a:t>
-            </a:r>
-            <a:r>
-              <a:rPr lang="fr-FR" sz="1800" dirty="0">
-                <a:solidFill>
-                  <a:srgbClr val="0D0D0D"/>
-                </a:solidFill>
-                <a:effectLst/>
-                <a:latin typeface="Times New Roman" panose="02020603050405020304" pitchFamily="18" charset="0"/>
-                <a:ea typeface="Calibri" panose="020F0502020204030204" pitchFamily="34" charset="0"/>
-                <a:cs typeface="Times New Roman" panose="02020603050405020304" pitchFamily="18" charset="0"/>
-              </a:rPr>
-              <a:t>, elle prend une propriété </a:t>
-            </a:r>
-            <a:r>
-              <a:rPr lang="fr-FR" sz="1800" b="1" i="1" dirty="0">
-                <a:solidFill>
-                  <a:srgbClr val="0D0D0D"/>
-                </a:solidFill>
-                <a:effectLst/>
-                <a:latin typeface="Times New Roman" panose="02020603050405020304" pitchFamily="18" charset="0"/>
-                <a:ea typeface="Calibri" panose="020F0502020204030204" pitchFamily="34" charset="0"/>
-                <a:cs typeface="Times New Roman" panose="02020603050405020304" pitchFamily="18" charset="0"/>
-              </a:rPr>
-              <a:t>_</a:t>
-            </a:r>
-            <a:r>
-              <a:rPr lang="fr-FR" sz="1800" b="1" i="1" dirty="0" err="1">
-                <a:solidFill>
-                  <a:srgbClr val="0D0D0D"/>
-                </a:solidFill>
-                <a:effectLst/>
-                <a:latin typeface="Times New Roman" panose="02020603050405020304" pitchFamily="18" charset="0"/>
-                <a:ea typeface="Calibri" panose="020F0502020204030204" pitchFamily="34" charset="0"/>
-                <a:cs typeface="Times New Roman" panose="02020603050405020304" pitchFamily="18" charset="0"/>
-              </a:rPr>
-              <a:t>ImageRGB</a:t>
-            </a:r>
-            <a:r>
-              <a:rPr lang="fr-FR" sz="1800" dirty="0">
-                <a:solidFill>
-                  <a:srgbClr val="0D0D0D"/>
-                </a:solidFill>
-                <a:effectLst/>
-                <a:latin typeface="Times New Roman" panose="02020603050405020304" pitchFamily="18" charset="0"/>
-                <a:ea typeface="Calibri" panose="020F0502020204030204" pitchFamily="34" charset="0"/>
-                <a:cs typeface="Times New Roman" panose="02020603050405020304" pitchFamily="18" charset="0"/>
-              </a:rPr>
-              <a:t> pour accéder aux données de pixels d’une image</a:t>
-            </a:r>
-            <a:r>
-              <a:rPr lang="fr-FR" sz="1800" b="1" i="1" dirty="0">
-                <a:solidFill>
-                  <a:srgbClr val="0D0D0D"/>
-                </a:solidFill>
-                <a:effectLst/>
-                <a:latin typeface="Times New Roman" panose="02020603050405020304" pitchFamily="18" charset="0"/>
-                <a:ea typeface="Calibri" panose="020F0502020204030204" pitchFamily="34" charset="0"/>
-                <a:cs typeface="Times New Roman" panose="02020603050405020304" pitchFamily="18" charset="0"/>
-              </a:rPr>
-              <a:t> RGB</a:t>
-            </a:r>
-            <a:r>
-              <a:rPr lang="fr-FR" sz="1800" dirty="0">
-                <a:solidFill>
-                  <a:srgbClr val="0D0D0D"/>
-                </a:solidFill>
-                <a:effectLst/>
-                <a:latin typeface="Times New Roman" panose="02020603050405020304" pitchFamily="18" charset="0"/>
-                <a:ea typeface="Calibri" panose="020F0502020204030204" pitchFamily="34" charset="0"/>
-                <a:cs typeface="Times New Roman" panose="02020603050405020304" pitchFamily="18" charset="0"/>
-              </a:rPr>
-              <a:t>. Elle inclut également des méthodes pour lire/écrire des fichiers PPM, charger une LUT binaire, convertir une image RGB en niveaux de gris.</a:t>
-            </a:r>
-          </a:p>
-          <a:p>
-            <a:pPr algn="just">
-              <a:lnSpc>
-                <a:spcPct val="150000"/>
-              </a:lnSpc>
-            </a:pPr>
-            <a:r>
-              <a:rPr lang="fr-FR" sz="1800" dirty="0">
-                <a:solidFill>
-                  <a:srgbClr val="0D0D0D"/>
-                </a:solidFill>
-                <a:effectLst/>
-                <a:latin typeface="Times New Roman" panose="02020603050405020304" pitchFamily="18" charset="0"/>
-                <a:ea typeface="Calibri" panose="020F0502020204030204" pitchFamily="34" charset="0"/>
-                <a:cs typeface="Times New Roman" panose="02020603050405020304" pitchFamily="18" charset="0"/>
-              </a:rPr>
-              <a:t>Cette classe propose aussi une </a:t>
-            </a:r>
-            <a:r>
-              <a:rPr lang="fr-FR" sz="1800" b="1" dirty="0">
-                <a:solidFill>
-                  <a:srgbClr val="0D0D0D"/>
-                </a:solidFill>
-                <a:effectLst/>
-                <a:latin typeface="Times New Roman" panose="02020603050405020304" pitchFamily="18" charset="0"/>
-                <a:ea typeface="Calibri" panose="020F0502020204030204" pitchFamily="34" charset="0"/>
-                <a:cs typeface="Times New Roman" panose="02020603050405020304" pitchFamily="18" charset="0"/>
-              </a:rPr>
-              <a:t>surcharge de constructeurs</a:t>
-            </a:r>
-            <a:r>
-              <a:rPr lang="fr-FR" sz="1800" dirty="0">
-                <a:solidFill>
-                  <a:srgbClr val="0D0D0D"/>
-                </a:solidFill>
-                <a:effectLst/>
-                <a:latin typeface="Times New Roman" panose="02020603050405020304" pitchFamily="18" charset="0"/>
-                <a:ea typeface="Calibri" panose="020F0502020204030204" pitchFamily="34" charset="0"/>
-                <a:cs typeface="Times New Roman" panose="02020603050405020304" pitchFamily="18" charset="0"/>
-              </a:rPr>
-              <a:t> :</a:t>
-            </a:r>
-          </a:p>
-          <a:p>
-            <a:pPr algn="just"/>
-            <a:r>
-              <a:rPr lang="fr-FR" sz="1800" b="1" dirty="0">
-                <a:solidFill>
-                  <a:srgbClr val="0D0D0D"/>
-                </a:solidFill>
-                <a:effectLst/>
-                <a:latin typeface="Times New Roman" panose="02020603050405020304" pitchFamily="18" charset="0"/>
-                <a:ea typeface="Calibri" panose="020F0502020204030204" pitchFamily="34" charset="0"/>
-                <a:cs typeface="Times New Roman" panose="02020603050405020304" pitchFamily="18" charset="0"/>
-              </a:rPr>
-              <a:t>Une class </a:t>
-            </a:r>
-            <a:r>
-              <a:rPr lang="fr-FR" sz="1800" dirty="0">
-                <a:solidFill>
-                  <a:srgbClr val="0D0D0D"/>
-                </a:solidFill>
-                <a:effectLst/>
-                <a:latin typeface="Times New Roman" panose="02020603050405020304" pitchFamily="18" charset="0"/>
-                <a:ea typeface="Calibri" panose="020F0502020204030204" pitchFamily="34" charset="0"/>
-                <a:cs typeface="Times New Roman" panose="02020603050405020304" pitchFamily="18" charset="0"/>
-              </a:rPr>
-              <a:t>est un </a:t>
-            </a:r>
-            <a:r>
-              <a:rPr lang="fr-FR" sz="1800" b="1" dirty="0">
-                <a:solidFill>
-                  <a:srgbClr val="0D0D0D"/>
-                </a:solidFill>
-                <a:effectLst/>
-                <a:latin typeface="Times New Roman" panose="02020603050405020304" pitchFamily="18" charset="0"/>
-                <a:ea typeface="Calibri" panose="020F0502020204030204" pitchFamily="34" charset="0"/>
-                <a:cs typeface="Times New Roman" panose="02020603050405020304" pitchFamily="18" charset="0"/>
-              </a:rPr>
-              <a:t>modèle </a:t>
-            </a:r>
-            <a:r>
-              <a:rPr lang="fr-FR" sz="1800" dirty="0">
-                <a:solidFill>
-                  <a:srgbClr val="0D0D0D"/>
-                </a:solidFill>
-                <a:effectLst/>
-                <a:latin typeface="Times New Roman" panose="02020603050405020304" pitchFamily="18" charset="0"/>
-                <a:ea typeface="Calibri" panose="020F0502020204030204" pitchFamily="34" charset="0"/>
-                <a:cs typeface="Times New Roman" panose="02020603050405020304" pitchFamily="18" charset="0"/>
-              </a:rPr>
-              <a:t>qui sert à </a:t>
-            </a:r>
-            <a:r>
-              <a:rPr lang="fr-FR" sz="1800" b="1" dirty="0">
-                <a:solidFill>
-                  <a:srgbClr val="0D0D0D"/>
-                </a:solidFill>
-                <a:effectLst/>
-                <a:latin typeface="Times New Roman" panose="02020603050405020304" pitchFamily="18" charset="0"/>
-                <a:ea typeface="Calibri" panose="020F0502020204030204" pitchFamily="34" charset="0"/>
-                <a:cs typeface="Times New Roman" panose="02020603050405020304" pitchFamily="18" charset="0"/>
-              </a:rPr>
-              <a:t>créer des objets, elle regroupe des attributs et des fonctions dans une structure cohérente</a:t>
-            </a:r>
-            <a:endParaRPr lang="fr-FR" sz="1800" dirty="0">
-              <a:solidFill>
-                <a:srgbClr val="0D0D0D"/>
-              </a:solidFill>
-              <a:effectLst/>
-              <a:latin typeface="Times New Roman" panose="02020603050405020304" pitchFamily="18" charset="0"/>
-              <a:ea typeface="Calibri" panose="020F0502020204030204" pitchFamily="34" charset="0"/>
-              <a:cs typeface="Times New Roman" panose="02020603050405020304" pitchFamily="18" charset="0"/>
-            </a:endParaRPr>
-          </a:p>
-          <a:p>
-            <a:pPr algn="just"/>
-            <a:r>
-              <a:rPr lang="fr-FR" sz="1800" dirty="0">
-                <a:solidFill>
-                  <a:srgbClr val="0D0D0D"/>
-                </a:solidFill>
-                <a:effectLst/>
-                <a:latin typeface="Times New Roman" panose="02020603050405020304" pitchFamily="18" charset="0"/>
-                <a:ea typeface="Calibri" panose="020F0502020204030204" pitchFamily="34" charset="0"/>
-                <a:cs typeface="Times New Roman" panose="02020603050405020304" pitchFamily="18" charset="0"/>
-              </a:rPr>
-              <a:t>Un </a:t>
-            </a:r>
-            <a:r>
-              <a:rPr lang="fr-FR" sz="1800" b="1" dirty="0">
-                <a:solidFill>
-                  <a:srgbClr val="0D0D0D"/>
-                </a:solidFill>
-                <a:effectLst/>
-                <a:latin typeface="Times New Roman" panose="02020603050405020304" pitchFamily="18" charset="0"/>
-                <a:ea typeface="Calibri" panose="020F0502020204030204" pitchFamily="34" charset="0"/>
-                <a:cs typeface="Times New Roman" panose="02020603050405020304" pitchFamily="18" charset="0"/>
-              </a:rPr>
-              <a:t>constructeur</a:t>
-            </a:r>
-            <a:r>
-              <a:rPr lang="fr-FR" sz="1800" dirty="0">
-                <a:solidFill>
-                  <a:srgbClr val="0D0D0D"/>
-                </a:solidFill>
-                <a:effectLst/>
-                <a:latin typeface="Times New Roman" panose="02020603050405020304" pitchFamily="18" charset="0"/>
-                <a:ea typeface="Calibri" panose="020F0502020204030204" pitchFamily="34" charset="0"/>
-                <a:cs typeface="Times New Roman" panose="02020603050405020304" pitchFamily="18" charset="0"/>
-              </a:rPr>
-              <a:t> est une</a:t>
-            </a:r>
-            <a:r>
-              <a:rPr lang="fr-FR" sz="1800" b="1" dirty="0">
-                <a:solidFill>
-                  <a:srgbClr val="0D0D0D"/>
-                </a:solidFill>
-                <a:effectLst/>
-                <a:latin typeface="Times New Roman" panose="02020603050405020304" pitchFamily="18" charset="0"/>
-                <a:ea typeface="Calibri" panose="020F0502020204030204" pitchFamily="34" charset="0"/>
-                <a:cs typeface="Times New Roman" panose="02020603050405020304" pitchFamily="18" charset="0"/>
-              </a:rPr>
-              <a:t> méthode prends le même nom de la class</a:t>
-            </a:r>
-            <a:r>
-              <a:rPr lang="fr-FR" sz="1800" dirty="0">
-                <a:solidFill>
-                  <a:srgbClr val="0D0D0D"/>
-                </a:solidFill>
-                <a:effectLst/>
-                <a:latin typeface="Times New Roman" panose="02020603050405020304" pitchFamily="18" charset="0"/>
-                <a:ea typeface="Calibri" panose="020F0502020204030204" pitchFamily="34" charset="0"/>
-                <a:cs typeface="Times New Roman" panose="02020603050405020304" pitchFamily="18" charset="0"/>
-              </a:rPr>
-              <a:t> qui est appelée </a:t>
-            </a:r>
-            <a:r>
-              <a:rPr lang="fr-FR" sz="1800" b="1" dirty="0">
-                <a:solidFill>
-                  <a:srgbClr val="0D0D0D"/>
-                </a:solidFill>
-                <a:effectLst/>
-                <a:latin typeface="Times New Roman" panose="02020603050405020304" pitchFamily="18" charset="0"/>
-                <a:ea typeface="Calibri" panose="020F0502020204030204" pitchFamily="34" charset="0"/>
-                <a:cs typeface="Times New Roman" panose="02020603050405020304" pitchFamily="18" charset="0"/>
-              </a:rPr>
-              <a:t>automatiquement lorsqu’un objet est créé.</a:t>
-            </a:r>
-            <a:endParaRPr lang="fr-FR" sz="1800" dirty="0">
-              <a:solidFill>
-                <a:srgbClr val="0D0D0D"/>
-              </a:solidFill>
-              <a:effectLst/>
-              <a:latin typeface="Times New Roman" panose="02020603050405020304" pitchFamily="18" charset="0"/>
-              <a:ea typeface="Calibri" panose="020F0502020204030204" pitchFamily="34" charset="0"/>
-              <a:cs typeface="Times New Roman" panose="02020603050405020304" pitchFamily="18" charset="0"/>
-            </a:endParaRPr>
-          </a:p>
-          <a:p>
-            <a:pPr marL="171450" indent="-171450">
-              <a:buFont typeface="Arial" panose="020B0604020202020204" pitchFamily="34" charset="0"/>
-              <a:buChar char="•"/>
-            </a:pPr>
-            <a:endParaRPr lang="fr-FR" dirty="0"/>
-          </a:p>
-        </p:txBody>
-      </p:sp>
-      <p:sp>
-        <p:nvSpPr>
-          <p:cNvPr id="4" name="Espace réservé du numéro de diapositive 3"/>
-          <p:cNvSpPr>
-            <a:spLocks noGrp="1"/>
-          </p:cNvSpPr>
-          <p:nvPr>
-            <p:ph type="sldNum" sz="quarter" idx="5"/>
-          </p:nvPr>
-        </p:nvSpPr>
-        <p:spPr/>
-        <p:txBody>
-          <a:bodyPr/>
-          <a:lstStyle/>
-          <a:p>
-            <a:fld id="{C7B300EB-8BAD-4183-8623-19644C4FEA4C}" type="slidenum">
-              <a:rPr lang="fr-FR" smtClean="0"/>
-              <a:t>10</a:t>
-            </a:fld>
-            <a:endParaRPr lang="fr-FR"/>
-          </a:p>
-        </p:txBody>
-      </p:sp>
-    </p:spTree>
-    <p:extLst>
-      <p:ext uri="{BB962C8B-B14F-4D97-AF65-F5344CB8AC3E}">
-        <p14:creationId xmlns:p14="http://schemas.microsoft.com/office/powerpoint/2010/main" val="531766603"/>
       </p:ext>
     </p:extLst>
   </p:cSld>
@@ -3509,7 +4599,7 @@
             <a:fld id="{B61BEF0D-F0BB-DE4B-95CE-6DB70DBA9567}" type="datetimeFigureOut">
               <a:rPr lang="en-US" dirty="0"/>
               <a:pPr/>
-              <a:t>6/15/2025</a:t>
+              <a:t>6/18/2025</a:t>
             </a:fld>
             <a:endParaRPr lang="en-US" dirty="0"/>
           </a:p>
@@ -3844,7 +4934,7 @@
             <a:fld id="{B61BEF0D-F0BB-DE4B-95CE-6DB70DBA9567}" type="datetimeFigureOut">
               <a:rPr lang="en-US" dirty="0"/>
               <a:pPr/>
-              <a:t>6/15/2025</a:t>
+              <a:t>6/18/2025</a:t>
             </a:fld>
             <a:endParaRPr lang="en-US" dirty="0"/>
           </a:p>
@@ -4242,7 +5332,7 @@
             <a:fld id="{B61BEF0D-F0BB-DE4B-95CE-6DB70DBA9567}" type="datetimeFigureOut">
               <a:rPr lang="en-US" dirty="0"/>
               <a:pPr/>
-              <a:t>6/15/2025</a:t>
+              <a:t>6/18/2025</a:t>
             </a:fld>
             <a:endParaRPr lang="en-US" dirty="0"/>
           </a:p>
@@ -4575,7 +5665,7 @@
             <a:fld id="{B61BEF0D-F0BB-DE4B-95CE-6DB70DBA9567}" type="datetimeFigureOut">
               <a:rPr lang="en-US" dirty="0"/>
               <a:pPr/>
-              <a:t>6/15/2025</a:t>
+              <a:t>6/18/2025</a:t>
             </a:fld>
             <a:endParaRPr lang="en-US" dirty="0"/>
           </a:p>
@@ -4892,7 +5982,7 @@
             <a:fld id="{B61BEF0D-F0BB-DE4B-95CE-6DB70DBA9567}" type="datetimeFigureOut">
               <a:rPr lang="en-US" dirty="0"/>
               <a:pPr/>
-              <a:t>6/15/2025</a:t>
+              <a:t>6/18/2025</a:t>
             </a:fld>
             <a:endParaRPr lang="en-US" dirty="0"/>
           </a:p>
@@ -5285,7 +6375,7 @@
             <a:fld id="{B61BEF0D-F0BB-DE4B-95CE-6DB70DBA9567}" type="datetimeFigureOut">
               <a:rPr lang="en-US" dirty="0"/>
               <a:pPr/>
-              <a:t>6/15/2025</a:t>
+              <a:t>6/18/2025</a:t>
             </a:fld>
             <a:endParaRPr lang="en-US" dirty="0"/>
           </a:p>
@@ -5539,7 +6629,7 @@
             <a:fld id="{B61BEF0D-F0BB-DE4B-95CE-6DB70DBA9567}" type="datetimeFigureOut">
               <a:rPr lang="en-US" dirty="0"/>
               <a:pPr/>
-              <a:t>6/15/2025</a:t>
+              <a:t>6/18/2025</a:t>
             </a:fld>
             <a:endParaRPr lang="en-US" dirty="0"/>
           </a:p>
@@ -5798,7 +6888,7 @@
             <a:fld id="{B61BEF0D-F0BB-DE4B-95CE-6DB70DBA9567}" type="datetimeFigureOut">
               <a:rPr lang="en-US" dirty="0"/>
               <a:pPr/>
-              <a:t>6/15/2025</a:t>
+              <a:t>6/18/2025</a:t>
             </a:fld>
             <a:endParaRPr lang="en-US" dirty="0"/>
           </a:p>
@@ -6057,7 +7147,7 @@
             <a:fld id="{B61BEF0D-F0BB-DE4B-95CE-6DB70DBA9567}" type="datetimeFigureOut">
               <a:rPr lang="en-US" dirty="0"/>
               <a:pPr/>
-              <a:t>6/15/2025</a:t>
+              <a:t>6/18/2025</a:t>
             </a:fld>
             <a:endParaRPr lang="en-US" dirty="0"/>
           </a:p>
@@ -6383,7 +7473,7 @@
             <a:fld id="{B61BEF0D-F0BB-DE4B-95CE-6DB70DBA9567}" type="datetimeFigureOut">
               <a:rPr lang="en-US" dirty="0"/>
               <a:pPr/>
-              <a:t>6/15/2025</a:t>
+              <a:t>6/18/2025</a:t>
             </a:fld>
             <a:endParaRPr lang="en-US" dirty="0"/>
           </a:p>
@@ -6703,7 +7793,7 @@
             <a:fld id="{B61BEF0D-F0BB-DE4B-95CE-6DB70DBA9567}" type="datetimeFigureOut">
               <a:rPr lang="en-US" dirty="0"/>
               <a:pPr/>
-              <a:t>6/15/2025</a:t>
+              <a:t>6/18/2025</a:t>
             </a:fld>
             <a:endParaRPr lang="en-US" dirty="0"/>
           </a:p>
@@ -7157,7 +8247,7 @@
             <a:fld id="{B61BEF0D-F0BB-DE4B-95CE-6DB70DBA9567}" type="datetimeFigureOut">
               <a:rPr lang="en-US" dirty="0"/>
               <a:pPr/>
-              <a:t>6/15/2025</a:t>
+              <a:t>6/18/2025</a:t>
             </a:fld>
             <a:endParaRPr lang="en-US" dirty="0"/>
           </a:p>
@@ -7359,7 +8449,7 @@
             <a:fld id="{B61BEF0D-F0BB-DE4B-95CE-6DB70DBA9567}" type="datetimeFigureOut">
               <a:rPr lang="en-US" dirty="0"/>
               <a:pPr/>
-              <a:t>6/15/2025</a:t>
+              <a:t>6/18/2025</a:t>
             </a:fld>
             <a:endParaRPr lang="en-US" dirty="0"/>
           </a:p>
@@ -7533,7 +8623,7 @@
             <a:fld id="{B61BEF0D-F0BB-DE4B-95CE-6DB70DBA9567}" type="datetimeFigureOut">
               <a:rPr lang="en-US" dirty="0"/>
               <a:pPr/>
-              <a:t>6/15/2025</a:t>
+              <a:t>6/18/2025</a:t>
             </a:fld>
             <a:endParaRPr lang="en-US" dirty="0"/>
           </a:p>
@@ -7863,7 +8953,7 @@
             <a:fld id="{B61BEF0D-F0BB-DE4B-95CE-6DB70DBA9567}" type="datetimeFigureOut">
               <a:rPr lang="en-US" dirty="0"/>
               <a:pPr/>
-              <a:t>6/15/2025</a:t>
+              <a:t>6/18/2025</a:t>
             </a:fld>
             <a:endParaRPr lang="en-US" dirty="0"/>
           </a:p>
@@ -8205,7 +9295,7 @@
             <a:fld id="{B61BEF0D-F0BB-DE4B-95CE-6DB70DBA9567}" type="datetimeFigureOut">
               <a:rPr lang="en-US" dirty="0"/>
               <a:pPr/>
-              <a:t>6/15/2025</a:t>
+              <a:t>6/18/2025</a:t>
             </a:fld>
             <a:endParaRPr lang="en-US" dirty="0"/>
           </a:p>
@@ -10319,7 +11409,7 @@
             <a:fld id="{B61BEF0D-F0BB-DE4B-95CE-6DB70DBA9567}" type="datetimeFigureOut">
               <a:rPr lang="en-US" dirty="0"/>
               <a:pPr/>
-              <a:t>6/15/2025</a:t>
+              <a:t>6/18/2025</a:t>
             </a:fld>
             <a:endParaRPr lang="en-US" dirty="0"/>
           </a:p>
@@ -13569,96 +14659,6 @@
       </p:sp>
       <p:sp>
         <p:nvSpPr>
-          <p:cNvPr id="13" name="Rectangle : coins arrondis 12">
-            <a:extLst>
-              <a:ext uri="{FF2B5EF4-FFF2-40B4-BE49-F238E27FC236}">
-                <a16:creationId xmlns:a16="http://schemas.microsoft.com/office/drawing/2014/main" id="{6078E3CC-2953-4295-9F81-47C66A8F367F}"/>
-              </a:ext>
-            </a:extLst>
-          </p:cNvPr>
-          <p:cNvSpPr/>
-          <p:nvPr/>
-        </p:nvSpPr>
-        <p:spPr>
-          <a:xfrm>
-            <a:off x="-3660530" y="1372420"/>
-            <a:ext cx="2547258" cy="587828"/>
-          </a:xfrm>
-          <a:prstGeom prst="roundRect">
-            <a:avLst/>
-          </a:prstGeom>
-          <a:solidFill>
-            <a:schemeClr val="bg2"/>
-          </a:solidFill>
-          <a:ln>
-            <a:noFill/>
-          </a:ln>
-          <a:effectLst>
-            <a:glow rad="101600">
-              <a:schemeClr val="bg2">
-                <a:lumMod val="75000"/>
-                <a:alpha val="60000"/>
-              </a:schemeClr>
-            </a:glow>
-            <a:outerShdw blurRad="44450" dist="27940" dir="5400000" algn="ctr">
-              <a:srgbClr val="000000">
-                <a:alpha val="32000"/>
-              </a:srgbClr>
-            </a:outerShdw>
-            <a:reflection blurRad="6350" stA="52000" endA="300" endPos="35000" dir="5400000" sy="-100000" algn="bl" rotWithShape="0"/>
-          </a:effectLst>
-          <a:scene3d>
-            <a:camera prst="orthographicFront">
-              <a:rot lat="0" lon="0" rev="0"/>
-            </a:camera>
-            <a:lightRig rig="balanced" dir="t">
-              <a:rot lat="0" lon="0" rev="8700000"/>
-            </a:lightRig>
-          </a:scene3d>
-          <a:sp3d>
-            <a:bevelT w="190500" h="38100"/>
-          </a:sp3d>
-        </p:spPr>
-        <p:style>
-          <a:lnRef idx="2">
-            <a:schemeClr val="accent1">
-              <a:shade val="50000"/>
-            </a:schemeClr>
-          </a:lnRef>
-          <a:fillRef idx="1">
-            <a:schemeClr val="accent1"/>
-          </a:fillRef>
-          <a:effectRef idx="0">
-            <a:schemeClr val="accent1"/>
-          </a:effectRef>
-          <a:fontRef idx="minor">
-            <a:schemeClr val="lt1"/>
-          </a:fontRef>
-        </p:style>
-        <p:txBody>
-          <a:bodyPr rtlCol="0" anchor="ctr"/>
-          <a:lstStyle/>
-          <a:p>
-            <a:pPr algn="ctr"/>
-            <a:r>
-              <a:rPr lang="fr-FR" b="1" dirty="0">
-                <a:solidFill>
-                  <a:schemeClr val="tx1"/>
-                </a:solidFill>
-                <a:latin typeface="Times New Roman" panose="02020603050405020304" pitchFamily="18" charset="0"/>
-                <a:cs typeface="Times New Roman" panose="02020603050405020304" pitchFamily="18" charset="0"/>
-              </a:rPr>
-              <a:t>Addition de deux images </a:t>
-            </a:r>
-            <a:endParaRPr lang="fr-FR" b="1" dirty="0">
-              <a:latin typeface="Times New Roman" panose="02020603050405020304" pitchFamily="18" charset="0"/>
-              <a:cs typeface="Times New Roman" panose="02020603050405020304" pitchFamily="18" charset="0"/>
-            </a:endParaRPr>
-          </a:p>
-        </p:txBody>
-      </p:sp>
-      <p:sp>
-        <p:nvSpPr>
           <p:cNvPr id="14" name="Rectangle : coins arrondis 13">
             <a:extLst>
               <a:ext uri="{FF2B5EF4-FFF2-40B4-BE49-F238E27FC236}">
@@ -13874,6 +14874,96 @@
           </a:effectLst>
         </p:spPr>
       </p:pic>
+      <p:sp>
+        <p:nvSpPr>
+          <p:cNvPr id="16" name="Rectangle : coins arrondis 15">
+            <a:extLst>
+              <a:ext uri="{FF2B5EF4-FFF2-40B4-BE49-F238E27FC236}">
+                <a16:creationId xmlns:a16="http://schemas.microsoft.com/office/drawing/2014/main" id="{3A6E23DA-BBE6-49D3-ACB6-7F2BC3CB05B6}"/>
+              </a:ext>
+            </a:extLst>
+          </p:cNvPr>
+          <p:cNvSpPr/>
+          <p:nvPr/>
+        </p:nvSpPr>
+        <p:spPr>
+          <a:xfrm>
+            <a:off x="-3170392" y="1372420"/>
+            <a:ext cx="2547258" cy="587828"/>
+          </a:xfrm>
+          <a:prstGeom prst="roundRect">
+            <a:avLst/>
+          </a:prstGeom>
+          <a:solidFill>
+            <a:schemeClr val="bg2"/>
+          </a:solidFill>
+          <a:ln>
+            <a:noFill/>
+          </a:ln>
+          <a:effectLst>
+            <a:glow rad="101600">
+              <a:schemeClr val="bg2">
+                <a:lumMod val="75000"/>
+                <a:alpha val="60000"/>
+              </a:schemeClr>
+            </a:glow>
+            <a:outerShdw blurRad="44450" dist="27940" dir="5400000" algn="ctr">
+              <a:srgbClr val="000000">
+                <a:alpha val="32000"/>
+              </a:srgbClr>
+            </a:outerShdw>
+            <a:reflection blurRad="6350" stA="52000" endA="300" endPos="35000" dir="5400000" sy="-100000" algn="bl" rotWithShape="0"/>
+          </a:effectLst>
+          <a:scene3d>
+            <a:camera prst="orthographicFront">
+              <a:rot lat="0" lon="0" rev="0"/>
+            </a:camera>
+            <a:lightRig rig="balanced" dir="t">
+              <a:rot lat="0" lon="0" rev="8700000"/>
+            </a:lightRig>
+          </a:scene3d>
+          <a:sp3d>
+            <a:bevelT w="190500" h="38100"/>
+          </a:sp3d>
+        </p:spPr>
+        <p:style>
+          <a:lnRef idx="2">
+            <a:schemeClr val="accent1">
+              <a:shade val="50000"/>
+            </a:schemeClr>
+          </a:lnRef>
+          <a:fillRef idx="1">
+            <a:schemeClr val="accent1"/>
+          </a:fillRef>
+          <a:effectRef idx="0">
+            <a:schemeClr val="accent1"/>
+          </a:effectRef>
+          <a:fontRef idx="minor">
+            <a:schemeClr val="lt1"/>
+          </a:fontRef>
+        </p:style>
+        <p:txBody>
+          <a:bodyPr rtlCol="0" anchor="ctr"/>
+          <a:lstStyle/>
+          <a:p>
+            <a:pPr algn="ctr"/>
+            <a:r>
+              <a:rPr lang="fr-FR" b="1" dirty="0">
+                <a:solidFill>
+                  <a:schemeClr val="tx1"/>
+                </a:solidFill>
+                <a:latin typeface="Times New Roman" panose="02020603050405020304" pitchFamily="18" charset="0"/>
+                <a:cs typeface="Times New Roman" panose="02020603050405020304" pitchFamily="18" charset="0"/>
+              </a:rPr>
+              <a:t>Addition d’images </a:t>
+            </a:r>
+            <a:endParaRPr lang="fr-FR" b="1" dirty="0">
+              <a:latin typeface="Times New Roman" panose="02020603050405020304" pitchFamily="18" charset="0"/>
+              <a:cs typeface="Times New Roman" panose="02020603050405020304" pitchFamily="18" charset="0"/>
+            </a:endParaRPr>
+          </a:p>
+        </p:txBody>
+      </p:sp>
     </p:spTree>
     <p:extLst>
       <p:ext uri="{BB962C8B-B14F-4D97-AF65-F5344CB8AC3E}">
@@ -14881,7 +15971,7 @@
                 <a:latin typeface="Times New Roman" panose="02020603050405020304" pitchFamily="18" charset="0"/>
                 <a:cs typeface="Times New Roman" panose="02020603050405020304" pitchFamily="18" charset="0"/>
               </a:rPr>
-              <a:t>Addition de deux images </a:t>
+              <a:t>Addition d’images </a:t>
             </a:r>
             <a:endParaRPr lang="fr-FR" b="1" dirty="0">
               <a:latin typeface="Times New Roman" panose="02020603050405020304" pitchFamily="18" charset="0"/>
@@ -15150,7 +16240,7 @@
         </p:blipFill>
         <p:spPr>
           <a:xfrm>
-            <a:off x="7244078" y="3774777"/>
+            <a:off x="7370918" y="3603227"/>
             <a:ext cx="2069500" cy="1898974"/>
           </a:xfrm>
           <a:prstGeom prst="rect">
@@ -15194,7 +16284,7 @@
         </p:blipFill>
         <p:spPr>
           <a:xfrm>
-            <a:off x="4470289" y="3803642"/>
+            <a:off x="4566971" y="3603227"/>
             <a:ext cx="2069500" cy="1816251"/>
           </a:xfrm>
           <a:prstGeom prst="rect">
@@ -15230,23 +16320,61 @@
         </p:nvSpPr>
         <p:spPr>
           <a:xfrm>
-            <a:off x="3761789" y="2568636"/>
-            <a:ext cx="7765158" cy="667239"/>
+            <a:off x="4433165" y="2715573"/>
+            <a:ext cx="5875506" cy="523480"/>
           </a:xfrm>
         </p:spPr>
         <p:txBody>
-          <a:bodyPr/>
+          <a:bodyPr>
+            <a:normAutofit fontScale="32500" lnSpcReduction="20000"/>
+          </a:bodyPr>
           <a:lstStyle/>
           <a:p>
             <a:r>
-              <a:rPr lang="fr-FR" sz="1800" dirty="0">
+              <a:rPr lang="fr-FR" sz="6000" b="1" dirty="0">
+                <a:solidFill>
+                  <a:schemeClr val="tx1"/>
+                </a:solidFill>
                 <a:effectLst/>
                 <a:latin typeface="Times New Roman" panose="02020603050405020304" pitchFamily="18" charset="0"/>
                 <a:ea typeface="Calibri" panose="020F0502020204030204" pitchFamily="34" charset="0"/>
                 <a:cs typeface="Times New Roman" panose="02020603050405020304" pitchFamily="18" charset="0"/>
               </a:rPr>
-              <a:t>Si les deux images ont les mêmes dimensions, l’addition se fait pixel par pixel, pour avoir une image du même format en sortie.</a:t>
-            </a:r>
+              <a:t>Addition</a:t>
+            </a:r>
+            <a:r>
+              <a:rPr lang="fr-FR" sz="4000" b="1" dirty="0">
+                <a:solidFill>
+                  <a:schemeClr val="tx1"/>
+                </a:solidFill>
+                <a:effectLst/>
+                <a:latin typeface="Times New Roman" panose="02020603050405020304" pitchFamily="18" charset="0"/>
+                <a:ea typeface="Calibri" panose="020F0502020204030204" pitchFamily="34" charset="0"/>
+                <a:cs typeface="Times New Roman" panose="02020603050405020304" pitchFamily="18" charset="0"/>
+              </a:rPr>
+              <a:t> </a:t>
+            </a:r>
+            <a:r>
+              <a:rPr lang="fr-FR" sz="6000" b="1" dirty="0">
+                <a:solidFill>
+                  <a:schemeClr val="tx1"/>
+                </a:solidFill>
+                <a:effectLst/>
+                <a:latin typeface="Times New Roman" panose="02020603050405020304" pitchFamily="18" charset="0"/>
+                <a:ea typeface="Calibri" panose="020F0502020204030204" pitchFamily="34" charset="0"/>
+                <a:cs typeface="Times New Roman" panose="02020603050405020304" pitchFamily="18" charset="0"/>
+              </a:rPr>
+              <a:t>de deux images de même dimensions </a:t>
+            </a:r>
+            <a:endParaRPr lang="fr-FR" sz="4000" b="1" dirty="0">
+              <a:solidFill>
+                <a:schemeClr val="tx1"/>
+              </a:solidFill>
+              <a:effectLst/>
+              <a:latin typeface="Times New Roman" panose="02020603050405020304" pitchFamily="18" charset="0"/>
+              <a:ea typeface="Calibri" panose="020F0502020204030204" pitchFamily="34" charset="0"/>
+              <a:cs typeface="Times New Roman" panose="02020603050405020304" pitchFamily="18" charset="0"/>
+            </a:endParaRPr>
           </a:p>
           <a:p>
             <a:endParaRPr lang="fr-FR" dirty="0"/>
@@ -15269,8 +16397,8 @@
         </p:nvSpPr>
         <p:spPr>
           <a:xfrm>
-            <a:off x="3761789" y="2547210"/>
-            <a:ext cx="8378097" cy="667239"/>
+            <a:off x="4433165" y="2646021"/>
+            <a:ext cx="7230140" cy="593032"/>
           </a:xfrm>
           <a:prstGeom prst="rect">
             <a:avLst/>
@@ -15500,7 +16628,7 @@
           </a:lstStyle>
           <a:p>
             <a:r>
-              <a:rPr lang="fr-FR" dirty="0">
+              <a:rPr lang="fr-FR" sz="2000" b="1" dirty="0">
                 <a:solidFill>
                   <a:schemeClr val="tx1"/>
                 </a:solidFill>
@@ -15508,45 +16636,9 @@
                 <a:ea typeface="Calibri" panose="020F0502020204030204" pitchFamily="34" charset="0"/>
                 <a:cs typeface="Times New Roman" panose="02020603050405020304" pitchFamily="18" charset="0"/>
               </a:rPr>
-              <a:t>Si </a:t>
-            </a:r>
-            <a:r>
-              <a:rPr lang="fr-FR" dirty="0">
-                <a:solidFill>
-                  <a:schemeClr val="tx1"/>
-                </a:solidFill>
-                <a:effectLst/>
-                <a:latin typeface="Times New Roman" panose="02020603050405020304" pitchFamily="18" charset="0"/>
-                <a:ea typeface="Calibri" panose="020F0502020204030204" pitchFamily="34" charset="0"/>
-                <a:cs typeface="Times New Roman" panose="02020603050405020304" pitchFamily="18" charset="0"/>
-              </a:rPr>
-              <a:t>leurs dimensions sont différentes, l’image la plus petite est d’abord étendue par l’ajout des zéros (</a:t>
-            </a:r>
-            <a:r>
-              <a:rPr lang="fr-FR" dirty="0" err="1">
-                <a:solidFill>
-                  <a:schemeClr val="tx1"/>
-                </a:solidFill>
-                <a:effectLst/>
-                <a:latin typeface="Times New Roman" panose="02020603050405020304" pitchFamily="18" charset="0"/>
-                <a:ea typeface="Calibri" panose="020F0502020204030204" pitchFamily="34" charset="0"/>
-                <a:cs typeface="Times New Roman" panose="02020603050405020304" pitchFamily="18" charset="0"/>
-              </a:rPr>
-              <a:t>padding</a:t>
-            </a:r>
-            <a:r>
-              <a:rPr lang="fr-FR" dirty="0">
-                <a:solidFill>
-                  <a:schemeClr val="tx1"/>
-                </a:solidFill>
-                <a:effectLst/>
-                <a:latin typeface="Times New Roman" panose="02020603050405020304" pitchFamily="18" charset="0"/>
-                <a:ea typeface="Calibri" panose="020F0502020204030204" pitchFamily="34" charset="0"/>
-                <a:cs typeface="Times New Roman" panose="02020603050405020304" pitchFamily="18" charset="0"/>
-              </a:rPr>
-              <a:t>), pour correspondre à la taille de l’image la plus grande avant d’effectue l’addition. </a:t>
-            </a:r>
-            <a:endParaRPr lang="fr-FR" dirty="0">
+              <a:t>Addition d’images de différentes dimensions </a:t>
+            </a:r>
+            <a:endParaRPr lang="fr-FR" sz="2000" b="1" dirty="0">
               <a:solidFill>
                 <a:schemeClr val="tx1"/>
               </a:solidFill>
@@ -15580,7 +16672,7 @@
         </p:blipFill>
         <p:spPr>
           <a:xfrm>
-            <a:off x="9333626" y="4203354"/>
+            <a:off x="8801313" y="3608268"/>
             <a:ext cx="1658303" cy="1737881"/>
           </a:xfrm>
           <a:prstGeom prst="rect">
@@ -15624,7 +16716,7 @@
         </p:blipFill>
         <p:spPr>
           <a:xfrm>
-            <a:off x="4663925" y="4214033"/>
+            <a:off x="4131612" y="3618947"/>
             <a:ext cx="1871381" cy="1721581"/>
           </a:xfrm>
           <a:prstGeom prst="rect">
@@ -15668,7 +16760,7 @@
         </p:blipFill>
         <p:spPr>
           <a:xfrm>
-            <a:off x="6938451" y="4203354"/>
+            <a:off x="6406138" y="3608268"/>
             <a:ext cx="1865822" cy="1732260"/>
           </a:xfrm>
           <a:prstGeom prst="rect">
@@ -15712,7 +16804,7 @@
         </p:blipFill>
         <p:spPr>
           <a:xfrm>
-            <a:off x="8940359" y="3747186"/>
+            <a:off x="8801313" y="3608268"/>
             <a:ext cx="1715824" cy="1826895"/>
           </a:xfrm>
           <a:prstGeom prst="rect">
@@ -15756,8 +16848,8 @@
         </p:blipFill>
         <p:spPr>
           <a:xfrm>
-            <a:off x="4294243" y="3722595"/>
-            <a:ext cx="1658303" cy="1857375"/>
+            <a:off x="4164663" y="3577788"/>
+            <a:ext cx="1931337" cy="1857375"/>
           </a:xfrm>
           <a:prstGeom prst="rect">
             <a:avLst/>
@@ -15800,8 +16892,8 @@
         </p:blipFill>
         <p:spPr>
           <a:xfrm>
-            <a:off x="6636471" y="3724326"/>
-            <a:ext cx="1715824" cy="1849755"/>
+            <a:off x="6406138" y="3577788"/>
+            <a:ext cx="1865822" cy="1849755"/>
           </a:xfrm>
           <a:prstGeom prst="rect">
             <a:avLst/>
@@ -16021,13 +17113,13 @@
   <p:clrMapOvr>
     <a:masterClrMapping/>
   </p:clrMapOvr>
-  <mc:AlternateContent xmlns:mc="http://schemas.openxmlformats.org/markup-compatibility/2006" xmlns:p159="http://schemas.microsoft.com/office/powerpoint/2015/09/main">
-    <mc:Choice Requires="p159">
+  <mc:AlternateContent xmlns:mc="http://schemas.openxmlformats.org/markup-compatibility/2006">
+    <mc:Choice xmlns:p159="http://schemas.microsoft.com/office/powerpoint/2015/09/main" Requires="p159">
       <p:transition xmlns:p14="http://schemas.microsoft.com/office/powerpoint/2010/main" spd="slow" p14:dur="2000">
-        <p159:morph option="byWord"/>
+        <p159:morph option="byObject"/>
       </p:transition>
     </mc:Choice>
-    <mc:Fallback xmlns="">
+    <mc:Fallback>
       <p:transition spd="slow">
         <p:fade/>
       </p:transition>
@@ -20327,8 +21419,8 @@
           </a:effectLst>
         </p:spPr>
       </p:pic>
-      <mc:AlternateContent xmlns:mc="http://schemas.openxmlformats.org/markup-compatibility/2006">
-        <mc:Choice xmlns:a14="http://schemas.microsoft.com/office/drawing/2010/main" Requires="a14">
+      <mc:AlternateContent xmlns:mc="http://schemas.openxmlformats.org/markup-compatibility/2006" xmlns:a14="http://schemas.microsoft.com/office/drawing/2010/main">
+        <mc:Choice Requires="a14">
           <p:sp>
             <p:nvSpPr>
               <p:cNvPr id="18" name="ZoneTexte 17">
@@ -20775,7 +21867,7 @@
             </p:txBody>
           </p:sp>
         </mc:Choice>
-        <mc:Fallback>
+        <mc:Fallback xmlns="">
           <p:sp>
             <p:nvSpPr>
               <p:cNvPr id="18" name="ZoneTexte 17">
@@ -33240,7 +34332,7 @@
           <p:nvPr/>
         </p:nvPicPr>
         <p:blipFill>
-          <a:blip r:embed="rId2"/>
+          <a:blip r:embed="rId3"/>
           <a:stretch>
             <a:fillRect/>
           </a:stretch>
@@ -33270,7 +34362,7 @@
           <p:nvPr/>
         </p:nvPicPr>
         <p:blipFill>
-          <a:blip r:embed="rId3"/>
+          <a:blip r:embed="rId4"/>
           <a:stretch>
             <a:fillRect/>
           </a:stretch>
@@ -33310,7 +34402,7 @@
           <p:nvPr/>
         </p:nvPicPr>
         <p:blipFill>
-          <a:blip r:embed="rId4"/>
+          <a:blip r:embed="rId5"/>
           <a:stretch>
             <a:fillRect/>
           </a:stretch>
@@ -33340,7 +34432,7 @@
           <p:nvPr/>
         </p:nvPicPr>
         <p:blipFill>
-          <a:blip r:embed="rId5"/>
+          <a:blip r:embed="rId6"/>
           <a:stretch>
             <a:fillRect/>
           </a:stretch>
@@ -33370,7 +34462,7 @@
           <p:nvPr/>
         </p:nvPicPr>
         <p:blipFill>
-          <a:blip r:embed="rId6"/>
+          <a:blip r:embed="rId7"/>
           <a:stretch>
             <a:fillRect/>
           </a:stretch>
@@ -33400,7 +34492,7 @@
           <p:nvPr/>
         </p:nvPicPr>
         <p:blipFill>
-          <a:blip r:embed="rId7"/>
+          <a:blip r:embed="rId8"/>
           <a:stretch>
             <a:fillRect/>
           </a:stretch>
@@ -35030,13 +36122,13 @@
   <p:clrMapOvr>
     <a:masterClrMapping/>
   </p:clrMapOvr>
-  <mc:AlternateContent xmlns:mc="http://schemas.openxmlformats.org/markup-compatibility/2006">
-    <mc:Choice xmlns:p159="http://schemas.microsoft.com/office/powerpoint/2015/09/main" Requires="p159">
+  <mc:AlternateContent xmlns:mc="http://schemas.openxmlformats.org/markup-compatibility/2006" xmlns:p159="http://schemas.microsoft.com/office/powerpoint/2015/09/main">
+    <mc:Choice Requires="p159">
       <p:transition xmlns:p14="http://schemas.microsoft.com/office/powerpoint/2010/main" spd="slow" p14:dur="2000">
         <p159:morph option="byObject"/>
       </p:transition>
     </mc:Choice>
-    <mc:Fallback>
+    <mc:Fallback xmlns="">
       <p:transition spd="slow">
         <p:fade/>
       </p:transition>
@@ -36153,13 +37245,13 @@
   <p:clrMapOvr>
     <a:masterClrMapping/>
   </p:clrMapOvr>
-  <mc:AlternateContent xmlns:mc="http://schemas.openxmlformats.org/markup-compatibility/2006">
-    <mc:Choice xmlns:p159="http://schemas.microsoft.com/office/powerpoint/2015/09/main" Requires="p159">
+  <mc:AlternateContent xmlns:mc="http://schemas.openxmlformats.org/markup-compatibility/2006" xmlns:p159="http://schemas.microsoft.com/office/powerpoint/2015/09/main">
+    <mc:Choice Requires="p159">
       <p:transition xmlns:p14="http://schemas.microsoft.com/office/powerpoint/2010/main" spd="slow" p14:dur="2000">
         <p159:morph option="byObject"/>
       </p:transition>
     </mc:Choice>
-    <mc:Fallback>
+    <mc:Fallback xmlns="">
       <p:transition spd="slow">
         <p:fade/>
       </p:transition>
@@ -38397,13 +39489,13 @@
   <p:clrMapOvr>
     <a:masterClrMapping/>
   </p:clrMapOvr>
-  <mc:AlternateContent xmlns:mc="http://schemas.openxmlformats.org/markup-compatibility/2006">
-    <mc:Choice xmlns:p159="http://schemas.microsoft.com/office/powerpoint/2015/09/main" Requires="p159">
+  <mc:AlternateContent xmlns:mc="http://schemas.openxmlformats.org/markup-compatibility/2006" xmlns:p159="http://schemas.microsoft.com/office/powerpoint/2015/09/main">
+    <mc:Choice Requires="p159">
       <p:transition xmlns:p14="http://schemas.microsoft.com/office/powerpoint/2010/main" spd="slow" p14:dur="2000">
         <p159:morph option="byObject"/>
       </p:transition>
     </mc:Choice>
-    <mc:Fallback>
+    <mc:Fallback xmlns="">
       <p:transition spd="slow">
         <p:fade/>
       </p:transition>

</xml_diff>